<commit_message>
Many changes + additions.     Almost there..
git-svn-id: file://localhost/tmp/svn2git/svn@303 defb5e50-622e-49ec-a68e-d72c7db87b45
</commit_message>
<xml_diff>
--- a/papers/cybertools08_poster/ahm08_poster.pptx
+++ b/papers/cybertools08_poster/ahm08_poster.pptx
@@ -4042,22 +4042,7 @@
                 <a:latin typeface="Tahoma"/>
                 <a:cs typeface="Tahoma"/>
               </a:rPr>
-              <a:t>Enabling Distributed Applications with </a:t>
-            </a:r>
-            <a:r>
-              <a:rPr lang="en-US" altLang="zh-TW" sz="8800" b="1" dirty="0" smtClean="0">
-                <a:solidFill>
-                  <a:srgbClr val="FFFFFF"/>
-                </a:solidFill>
-                <a:effectLst>
-                  <a:outerShdw blurRad="38100" dist="38100" dir="2700000" algn="tl">
-                    <a:srgbClr val="000000"/>
-                  </a:outerShdw>
-                </a:effectLst>
-                <a:latin typeface="Tahoma"/>
-                <a:cs typeface="Tahoma"/>
-              </a:rPr>
-              <a:t>SAGA</a:t>
+              <a:t>Enabling Distributed Applications with SAGA</a:t>
             </a:r>
             <a:r>
               <a:rPr lang="en-US" altLang="zh-TW" sz="8800" dirty="0" smtClean="0">
@@ -4161,7 +4146,22 @@
                 <a:latin typeface="Tahoma"/>
                 <a:cs typeface="Tahoma"/>
               </a:rPr>
-              <a:t> Kaiser</a:t>
+              <a:t> Kaiser, André </a:t>
+            </a:r>
+            <a:r>
+              <a:rPr lang="en-US" altLang="zh-TW" sz="4800" b="1" dirty="0" err="1" smtClean="0">
+                <a:solidFill>
+                  <a:schemeClr val="bg1"/>
+                </a:solidFill>
+                <a:effectLst>
+                  <a:outerShdw blurRad="38100" dist="38100" dir="2700000" algn="tl">
+                    <a:srgbClr val="000000"/>
+                  </a:outerShdw>
+                </a:effectLst>
+                <a:latin typeface="Tahoma"/>
+                <a:cs typeface="Tahoma"/>
+              </a:rPr>
+              <a:t>Merzky</a:t>
             </a:r>
             <a:r>
               <a:rPr lang="en-US" altLang="zh-TW" sz="4800" b="1" dirty="0" smtClean="0">
@@ -4176,7 +4176,22 @@
                 <a:latin typeface="Tahoma"/>
                 <a:cs typeface="Tahoma"/>
               </a:rPr>
-              <a:t>, </a:t>
+              <a:t>, Ole Weidner, Joao </a:t>
+            </a:r>
+            <a:r>
+              <a:rPr lang="en-US" altLang="zh-TW" sz="4800" b="1" dirty="0" err="1" smtClean="0">
+                <a:solidFill>
+                  <a:schemeClr val="bg1"/>
+                </a:solidFill>
+                <a:effectLst>
+                  <a:outerShdw blurRad="38100" dist="38100" dir="2700000" algn="tl">
+                    <a:srgbClr val="000000"/>
+                  </a:outerShdw>
+                </a:effectLst>
+                <a:latin typeface="Tahoma"/>
+                <a:cs typeface="Tahoma"/>
+              </a:rPr>
+              <a:t>Abecasis</a:t>
             </a:r>
             <a:r>
               <a:rPr lang="en-US" altLang="zh-TW" sz="4800" b="1" dirty="0" smtClean="0">
@@ -4191,7 +4206,7 @@
                 <a:latin typeface="Tahoma"/>
                 <a:cs typeface="Tahoma"/>
               </a:rPr>
-              <a:t>André </a:t>
+              <a:t>, </a:t>
             </a:r>
             <a:r>
               <a:rPr lang="en-US" altLang="zh-TW" sz="4800" b="1" dirty="0" err="1" smtClean="0">
@@ -4206,7 +4221,7 @@
                 <a:latin typeface="Tahoma"/>
                 <a:cs typeface="Tahoma"/>
               </a:rPr>
-              <a:t>Merzky</a:t>
+              <a:t>Joohyun</a:t>
             </a:r>
             <a:r>
               <a:rPr lang="en-US" altLang="zh-TW" sz="4800" b="1" dirty="0" smtClean="0">
@@ -4221,37 +4236,7 @@
                 <a:latin typeface="Tahoma"/>
                 <a:cs typeface="Tahoma"/>
               </a:rPr>
-              <a:t>, </a:t>
-            </a:r>
-            <a:r>
-              <a:rPr lang="en-US" altLang="zh-TW" sz="4800" b="1" dirty="0" smtClean="0">
-                <a:solidFill>
-                  <a:schemeClr val="bg1"/>
-                </a:solidFill>
-                <a:effectLst>
-                  <a:outerShdw blurRad="38100" dist="38100" dir="2700000" algn="tl">
-                    <a:srgbClr val="000000"/>
-                  </a:outerShdw>
-                </a:effectLst>
-                <a:latin typeface="Tahoma"/>
-                <a:cs typeface="Tahoma"/>
-              </a:rPr>
-              <a:t>Ole </a:t>
-            </a:r>
-            <a:r>
-              <a:rPr lang="en-US" altLang="zh-TW" sz="4800" b="1" dirty="0" smtClean="0">
-                <a:solidFill>
-                  <a:schemeClr val="bg1"/>
-                </a:solidFill>
-                <a:effectLst>
-                  <a:outerShdw blurRad="38100" dist="38100" dir="2700000" algn="tl">
-                    <a:srgbClr val="000000"/>
-                  </a:outerShdw>
-                </a:effectLst>
-                <a:latin typeface="Tahoma"/>
-                <a:cs typeface="Tahoma"/>
-              </a:rPr>
-              <a:t>Weidner, Joao </a:t>
+              <a:t> Kim and  Andre </a:t>
             </a:r>
             <a:r>
               <a:rPr lang="en-US" altLang="zh-TW" sz="4800" b="1" dirty="0" err="1" smtClean="0">
@@ -4266,66 +4251,6 @@
                 <a:latin typeface="Tahoma"/>
                 <a:cs typeface="Tahoma"/>
               </a:rPr>
-              <a:t>Abecasis</a:t>
-            </a:r>
-            <a:r>
-              <a:rPr lang="en-US" altLang="zh-TW" sz="4800" b="1" dirty="0" smtClean="0">
-                <a:solidFill>
-                  <a:schemeClr val="bg1"/>
-                </a:solidFill>
-                <a:effectLst>
-                  <a:outerShdw blurRad="38100" dist="38100" dir="2700000" algn="tl">
-                    <a:srgbClr val="000000"/>
-                  </a:outerShdw>
-                </a:effectLst>
-                <a:latin typeface="Tahoma"/>
-                <a:cs typeface="Tahoma"/>
-              </a:rPr>
-              <a:t>, </a:t>
-            </a:r>
-            <a:r>
-              <a:rPr lang="en-US" altLang="zh-TW" sz="4800" b="1" dirty="0" err="1" smtClean="0">
-                <a:solidFill>
-                  <a:schemeClr val="bg1"/>
-                </a:solidFill>
-                <a:effectLst>
-                  <a:outerShdw blurRad="38100" dist="38100" dir="2700000" algn="tl">
-                    <a:srgbClr val="000000"/>
-                  </a:outerShdw>
-                </a:effectLst>
-                <a:latin typeface="Tahoma"/>
-                <a:cs typeface="Tahoma"/>
-              </a:rPr>
-              <a:t>Joohyun</a:t>
-            </a:r>
-            <a:r>
-              <a:rPr lang="en-US" altLang="zh-TW" sz="4800" b="1" dirty="0" smtClean="0">
-                <a:solidFill>
-                  <a:schemeClr val="bg1"/>
-                </a:solidFill>
-                <a:effectLst>
-                  <a:outerShdw blurRad="38100" dist="38100" dir="2700000" algn="tl">
-                    <a:srgbClr val="000000"/>
-                  </a:outerShdw>
-                </a:effectLst>
-                <a:latin typeface="Tahoma"/>
-                <a:cs typeface="Tahoma"/>
-              </a:rPr>
-              <a:t> Kim and  Andre </a:t>
-            </a:r>
-            <a:r>
-              <a:rPr lang="en-US" altLang="zh-TW" sz="4800" b="1" dirty="0" err="1" smtClean="0">
-                <a:solidFill>
-                  <a:schemeClr val="bg1"/>
-                </a:solidFill>
-                <a:effectLst>
-                  <a:outerShdw blurRad="38100" dist="38100" dir="2700000" algn="tl">
-                    <a:srgbClr val="000000"/>
-                  </a:outerShdw>
-                </a:effectLst>
-                <a:latin typeface="Tahoma"/>
-                <a:cs typeface="Tahoma"/>
-              </a:rPr>
               <a:t>Luckow</a:t>
             </a:r>
             <a:r>
@@ -4370,37 +4295,7 @@
                 <a:latin typeface="Tahoma"/>
                 <a:cs typeface="Tahoma"/>
               </a:rPr>
-              <a:t>Center </a:t>
-            </a:r>
-            <a:r>
-              <a:rPr lang="en-US" altLang="zh-TW" sz="3600" b="1" dirty="0" smtClean="0">
-                <a:solidFill>
-                  <a:schemeClr val="bg1"/>
-                </a:solidFill>
-                <a:effectLst>
-                  <a:outerShdw blurRad="38100" dist="38100" dir="2700000" algn="tl">
-                    <a:srgbClr val="000000"/>
-                  </a:outerShdw>
-                </a:effectLst>
-                <a:latin typeface="Tahoma"/>
-                <a:cs typeface="Tahoma"/>
-              </a:rPr>
-              <a:t>for Computation &amp; Technology, Louisiana State University, Baton Rouge, U.S.A</a:t>
-            </a:r>
-            <a:r>
-              <a:rPr lang="en-US" altLang="zh-TW" sz="3600" b="1" dirty="0" smtClean="0">
-                <a:solidFill>
-                  <a:schemeClr val="bg1"/>
-                </a:solidFill>
-                <a:effectLst>
-                  <a:outerShdw blurRad="38100" dist="38100" dir="2700000" algn="tl">
-                    <a:srgbClr val="000000"/>
-                  </a:outerShdw>
-                </a:effectLst>
-                <a:latin typeface="Tahoma"/>
-                <a:cs typeface="Tahoma"/>
-              </a:rPr>
-              <a:t>.</a:t>
+              <a:t>Center for Computation &amp; Technology, Louisiana State University, Baton Rouge, U.S.A.</a:t>
             </a:r>
             <a:br>
               <a:rPr lang="en-US" altLang="zh-TW" sz="3600" b="1" dirty="0" smtClean="0">
@@ -4463,7 +4358,7 @@
         </p:nvSpPr>
         <p:spPr bwMode="auto">
           <a:xfrm>
-            <a:off x="764829" y="5029200"/>
+            <a:off x="764829" y="5042318"/>
             <a:ext cx="13103572" cy="16065082"/>
           </a:xfrm>
           <a:prstGeom prst="roundRect">
@@ -4765,30 +4660,6 @@
           </a:p>
         </p:txBody>
       </p:sp>
-      <p:pic>
-        <p:nvPicPr>
-          <p:cNvPr id="143" name="Picture 142" descr="ProcessHorizontal.jpg"/>
-          <p:cNvPicPr>
-            <a:picLocks noChangeAspect="1"/>
-          </p:cNvPicPr>
-          <p:nvPr/>
-        </p:nvPicPr>
-        <p:blipFill>
-          <a:blip r:embed="rId3"/>
-          <a:stretch>
-            <a:fillRect/>
-          </a:stretch>
-        </p:blipFill>
-        <p:spPr>
-          <a:xfrm>
-            <a:off x="310417" y="29826858"/>
-            <a:ext cx="6312916" cy="2733674"/>
-          </a:xfrm>
-          <a:prstGeom prst="rect">
-            <a:avLst/>
-          </a:prstGeom>
-        </p:spPr>
-      </p:pic>
       <p:grpSp>
         <p:nvGrpSpPr>
           <p:cNvPr id="13" name="Group 12"/>
@@ -4857,7 +4728,7 @@
             <p:nvPr/>
           </p:nvPicPr>
           <p:blipFill>
-            <a:blip r:embed="rId4"/>
+            <a:blip r:embed="rId3"/>
             <a:stretch>
               <a:fillRect/>
             </a:stretch>
@@ -4883,8 +4754,8 @@
         </p:nvSpPr>
         <p:spPr bwMode="auto">
           <a:xfrm>
-            <a:off x="897388" y="21646488"/>
-            <a:ext cx="27900090" cy="7919111"/>
+            <a:off x="897388" y="22021800"/>
+            <a:ext cx="27900090" cy="8458200"/>
           </a:xfrm>
           <a:prstGeom prst="roundRect">
             <a:avLst>
@@ -4934,8 +4805,8 @@
         </p:nvSpPr>
         <p:spPr bwMode="auto">
           <a:xfrm>
-            <a:off x="29265568" y="24910709"/>
-            <a:ext cx="13716000" cy="4654891"/>
+            <a:off x="29265567" y="24910709"/>
+            <a:ext cx="13715388" cy="5486400"/>
           </a:xfrm>
           <a:prstGeom prst="roundRect">
             <a:avLst>
@@ -4998,89 +4869,79 @@
               <a:buAutoNum type="arabicPeriod"/>
             </a:pPr>
             <a:r>
-              <a:rPr lang="en-US" sz="2800" dirty="0" err="1" smtClean="0">
+              <a:rPr lang="en-US" sz="3200" dirty="0" err="1" smtClean="0">
                 <a:latin typeface="Georgia"/>
                 <a:cs typeface="Georgia"/>
               </a:rPr>
               <a:t>Goodale</a:t>
             </a:r>
             <a:r>
-              <a:rPr lang="en-US" sz="2800" dirty="0" smtClean="0">
-                <a:latin typeface="Georgia"/>
-                <a:cs typeface="Georgia"/>
-              </a:rPr>
-              <a:t>, T, </a:t>
-            </a:r>
-            <a:r>
-              <a:rPr lang="en-US" sz="2800" dirty="0" err="1" smtClean="0">
-                <a:latin typeface="Georgia"/>
-                <a:cs typeface="Georgia"/>
-              </a:rPr>
-              <a:t>Jha</a:t>
-            </a:r>
-            <a:r>
-              <a:rPr lang="en-US" sz="2800" dirty="0" smtClean="0">
-                <a:latin typeface="Georgia"/>
-                <a:cs typeface="Georgia"/>
-              </a:rPr>
-              <a:t>, S, Kaiser, H, </a:t>
-            </a:r>
-            <a:r>
-              <a:rPr lang="en-US" sz="2800" dirty="0" err="1" smtClean="0">
+              <a:rPr lang="en-US" sz="3200" dirty="0" smtClean="0">
+                <a:latin typeface="Georgia"/>
+                <a:cs typeface="Georgia"/>
+              </a:rPr>
+              <a:t>, T, Jha, S, Kaiser, </a:t>
+            </a:r>
+            <a:r>
+              <a:rPr lang="en-US" sz="3200" dirty="0" smtClean="0">
+                <a:latin typeface="Georgia"/>
+                <a:cs typeface="Georgia"/>
+              </a:rPr>
+              <a:t>H, </a:t>
+            </a:r>
+            <a:r>
+              <a:rPr lang="en-US" sz="3200" dirty="0" err="1" smtClean="0">
                 <a:latin typeface="Georgia"/>
                 <a:cs typeface="Georgia"/>
               </a:rPr>
               <a:t>Kielmann</a:t>
             </a:r>
             <a:r>
-              <a:rPr lang="en-US" sz="2800" dirty="0" smtClean="0">
-                <a:latin typeface="Georgia"/>
-                <a:cs typeface="Georgia"/>
-              </a:rPr>
-              <a:t>, T, </a:t>
-            </a:r>
-            <a:r>
-              <a:rPr lang="en-US" sz="2800" dirty="0" err="1" smtClean="0">
-                <a:latin typeface="Georgia"/>
-                <a:cs typeface="Georgia"/>
-              </a:rPr>
-              <a:t>Kleijer</a:t>
-            </a:r>
-            <a:r>
-              <a:rPr lang="en-US" sz="2800" dirty="0" smtClean="0">
-                <a:latin typeface="Georgia"/>
-                <a:cs typeface="Georgia"/>
-              </a:rPr>
-              <a:t>, P, </a:t>
-            </a:r>
-            <a:r>
-              <a:rPr lang="en-US" sz="2800" dirty="0" err="1" smtClean="0">
-                <a:latin typeface="Georgia"/>
-                <a:cs typeface="Georgia"/>
-              </a:rPr>
-              <a:t>Merzky</a:t>
-            </a:r>
-            <a:r>
-              <a:rPr lang="en-US" sz="2800" dirty="0" smtClean="0">
-                <a:latin typeface="Georgia"/>
-                <a:cs typeface="Georgia"/>
-              </a:rPr>
-              <a:t>, A, </a:t>
-            </a:r>
-            <a:r>
-              <a:rPr lang="en-US" sz="2800" dirty="0" err="1" smtClean="0">
-                <a:latin typeface="Georgia"/>
-                <a:cs typeface="Georgia"/>
-              </a:rPr>
-              <a:t>Shalf</a:t>
-            </a:r>
-            <a:r>
-              <a:rPr lang="en-US" sz="2800" dirty="0" smtClean="0">
-                <a:latin typeface="Georgia"/>
-                <a:cs typeface="Georgia"/>
-              </a:rPr>
-              <a:t>, J, Smith, C, (2007) GFD-R-P.90 A Simple API for Grid Applications (SAGA), Open Grid Forum</a:t>
-            </a:r>
+              <a:rPr lang="en-US" sz="3200" dirty="0" smtClean="0">
+                <a:latin typeface="Georgia"/>
+                <a:cs typeface="Georgia"/>
+              </a:rPr>
+              <a:t>, T, et al (</a:t>
+            </a:r>
+            <a:r>
+              <a:rPr lang="en-US" sz="3200" dirty="0" smtClean="0">
+                <a:latin typeface="Georgia"/>
+                <a:cs typeface="Georgia"/>
+              </a:rPr>
+              <a:t>2007</a:t>
+            </a:r>
+            <a:r>
+              <a:rPr lang="en-US" sz="3200" dirty="0" smtClean="0">
+                <a:latin typeface="Georgia"/>
+                <a:cs typeface="Georgia"/>
+              </a:rPr>
+              <a:t>), </a:t>
+            </a:r>
+            <a:r>
+              <a:rPr lang="en-US" sz="3200" dirty="0" smtClean="0">
+                <a:latin typeface="Georgia"/>
+                <a:cs typeface="Georgia"/>
+              </a:rPr>
+              <a:t>GFD-R-P.90 A Simple API for Grid </a:t>
+            </a:r>
+            <a:r>
+              <a:rPr lang="en-US" sz="3200" dirty="0" smtClean="0">
+                <a:latin typeface="Georgia"/>
+                <a:cs typeface="Georgia"/>
+              </a:rPr>
+              <a:t>Applications (SAGA) Open </a:t>
+            </a:r>
+            <a:r>
+              <a:rPr lang="en-US" sz="3200" dirty="0" smtClean="0">
+                <a:latin typeface="Georgia"/>
+                <a:cs typeface="Georgia"/>
+              </a:rPr>
+              <a:t>Grid Forum</a:t>
+            </a:r>
+            <a:endParaRPr lang="en-US" sz="3200" dirty="0" smtClean="0">
+              <a:latin typeface="Georgia"/>
+              <a:cs typeface="Georgia"/>
+            </a:endParaRPr>
           </a:p>
           <a:p>
             <a:pPr marL="514350" indent="-514350" algn="just">
@@ -5094,24 +4955,143 @@
               <a:buAutoNum type="arabicPeriod"/>
             </a:pPr>
             <a:r>
-              <a:rPr lang="en-US" sz="2800" dirty="0" smtClean="0">
-                <a:latin typeface="Georgia"/>
-                <a:cs typeface="Georgia"/>
-              </a:rPr>
-              <a:t>SAGA C++ Project [Online]. http://</a:t>
-            </a:r>
-            <a:r>
-              <a:rPr lang="en-US" sz="2800" dirty="0" err="1" smtClean="0">
-                <a:latin typeface="Georgia"/>
-                <a:cs typeface="Georgia"/>
-              </a:rPr>
-              <a:t>saga.cct.lsu.edu</a:t>
-            </a:r>
-            <a:endParaRPr lang="en-US" sz="2800" dirty="0" smtClean="0">
+              <a:rPr lang="en-US" sz="3200" dirty="0" smtClean="0">
+                <a:latin typeface="Georgia"/>
+                <a:cs typeface="Georgia"/>
+              </a:rPr>
+              <a:t>The SAGA  Project </a:t>
+            </a:r>
+            <a:r>
+              <a:rPr lang="en-US" sz="3200" dirty="0" smtClean="0">
+                <a:latin typeface="Georgia"/>
+                <a:cs typeface="Georgia"/>
+              </a:rPr>
+              <a:t>[Online</a:t>
+            </a:r>
+            <a:r>
+              <a:rPr lang="en-US" sz="3200" dirty="0" smtClean="0">
+                <a:latin typeface="Georgia"/>
+                <a:cs typeface="Georgia"/>
+              </a:rPr>
+              <a:t>]: </a:t>
+            </a:r>
+            <a:r>
+              <a:rPr lang="en-US" sz="3200" dirty="0" smtClean="0">
+                <a:latin typeface="Georgia"/>
+                <a:cs typeface="Georgia"/>
+                <a:hlinkClick r:id="rId4"/>
+              </a:rPr>
+              <a:t>http://saga.cct.lsu.</a:t>
+            </a:r>
+            <a:r>
+              <a:rPr lang="en-US" sz="3200" dirty="0" smtClean="0">
+                <a:latin typeface="Georgia"/>
+                <a:cs typeface="Georgia"/>
+                <a:hlinkClick r:id="rId4"/>
+              </a:rPr>
+              <a:t>edu</a:t>
+            </a:r>
+            <a:endParaRPr lang="en-US" sz="3200" dirty="0" smtClean="0">
               <a:latin typeface="Georgia"/>
               <a:cs typeface="Georgia"/>
             </a:endParaRPr>
           </a:p>
+          <a:p>
+            <a:pPr marL="514350" indent="-514350" algn="just">
+              <a:lnSpc>
+                <a:spcPct val="130000"/>
+              </a:lnSpc>
+              <a:spcAft>
+                <a:spcPts val="600"/>
+              </a:spcAft>
+              <a:buFont typeface="+mj-lt"/>
+              <a:buAutoNum type="arabicPeriod"/>
+            </a:pPr>
+            <a:r>
+              <a:rPr lang="en-US" sz="3200" dirty="0" smtClean="0">
+                <a:latin typeface="Georgia"/>
+                <a:cs typeface="Georgia"/>
+              </a:rPr>
+              <a:t>SAGA Papers [Online]: </a:t>
+            </a:r>
+            <a:r>
+              <a:rPr lang="en-US" sz="3200" dirty="0" smtClean="0">
+                <a:latin typeface="Georgia"/>
+                <a:cs typeface="Georgia"/>
+                <a:hlinkClick r:id="rId5"/>
+              </a:rPr>
+              <a:t>http://saga.cct.lsu.edu/papers</a:t>
+            </a:r>
+            <a:endParaRPr lang="en-US" sz="3200" dirty="0" smtClean="0">
+              <a:latin typeface="Georgia"/>
+              <a:cs typeface="Georgia"/>
+            </a:endParaRPr>
+          </a:p>
+          <a:p>
+            <a:pPr marL="514350" indent="-514350" algn="just">
+              <a:lnSpc>
+                <a:spcPct val="130000"/>
+              </a:lnSpc>
+              <a:spcAft>
+                <a:spcPts val="600"/>
+              </a:spcAft>
+              <a:buFont typeface="+mj-lt"/>
+              <a:buAutoNum type="arabicPeriod"/>
+            </a:pPr>
+            <a:r>
+              <a:rPr lang="en-US" sz="3200" dirty="0" smtClean="0">
+                <a:latin typeface="Georgia"/>
+                <a:cs typeface="Georgia"/>
+              </a:rPr>
+              <a:t>SAGA Projects [Online]: http://</a:t>
+            </a:r>
+            <a:r>
+              <a:rPr lang="en-US" sz="3200" dirty="0" err="1" smtClean="0">
+                <a:latin typeface="Georgia"/>
+                <a:cs typeface="Georgia"/>
+              </a:rPr>
+              <a:t>saga.cct.lsu.edu</a:t>
+            </a:r>
+            <a:r>
+              <a:rPr lang="en-US" sz="3200" dirty="0" smtClean="0">
+                <a:latin typeface="Georgia"/>
+                <a:cs typeface="Georgia"/>
+              </a:rPr>
+              <a:t>/projects</a:t>
+            </a:r>
+          </a:p>
+          <a:p>
+            <a:pPr marL="514350" indent="-514350" algn="just">
+              <a:lnSpc>
+                <a:spcPct val="130000"/>
+              </a:lnSpc>
+              <a:spcAft>
+                <a:spcPts val="600"/>
+              </a:spcAft>
+              <a:buFont typeface="+mj-lt"/>
+              <a:buAutoNum type="arabicPeriod"/>
+            </a:pPr>
+            <a:endParaRPr lang="en-US" sz="3200" dirty="0" smtClean="0">
+              <a:latin typeface="Georgia"/>
+              <a:cs typeface="Georgia"/>
+            </a:endParaRPr>
+          </a:p>
+          <a:p>
+            <a:pPr marL="514350" indent="-514350" algn="just">
+              <a:lnSpc>
+                <a:spcPct val="130000"/>
+              </a:lnSpc>
+              <a:spcAft>
+                <a:spcPts val="600"/>
+              </a:spcAft>
+              <a:buFont typeface="+mj-lt"/>
+              <a:buAutoNum type="arabicPeriod"/>
+            </a:pPr>
+            <a:endParaRPr lang="en-US" sz="3200" dirty="0" smtClean="0">
+              <a:latin typeface="Georgia"/>
+              <a:cs typeface="Georgia"/>
+            </a:endParaRPr>
+          </a:p>
         </p:txBody>
       </p:sp>
       <p:sp>
@@ -5124,8 +5104,8 @@
         </p:nvSpPr>
         <p:spPr bwMode="auto">
           <a:xfrm>
-            <a:off x="7315200" y="30800338"/>
-            <a:ext cx="35666368" cy="1813262"/>
+            <a:off x="7315200" y="30369200"/>
+            <a:ext cx="35666368" cy="2625400"/>
           </a:xfrm>
           <a:prstGeom prst="roundRect">
             <a:avLst>
@@ -5155,6 +5135,16 @@
               </a:spcAft>
             </a:pPr>
             <a:r>
+              <a:rPr lang="en-US" sz="4000" b="1" dirty="0" smtClean="0">
+                <a:solidFill>
+                  <a:srgbClr val="000099"/>
+                </a:solidFill>
+                <a:latin typeface="Tahoma"/>
+                <a:cs typeface="Tahoma"/>
+              </a:rPr>
+              <a:t>Acknowledgements:</a:t>
+            </a:r>
+            <a:r>
               <a:rPr lang="en-US" sz="5400" b="1" dirty="0" smtClean="0">
                 <a:solidFill>
                   <a:srgbClr val="000099"/>
@@ -5162,71 +5152,39 @@
                 <a:latin typeface="Tahoma"/>
                 <a:cs typeface="Tahoma"/>
               </a:rPr>
-              <a:t>Acknowledgements: </a:t>
-            </a:r>
-            <a:r>
-              <a:rPr lang="en-US" sz="2800" dirty="0" smtClean="0">
-                <a:latin typeface="Georgia"/>
-                <a:cs typeface="Georgia"/>
-              </a:rPr>
-              <a:t>This work was supported</a:t>
-            </a:r>
-            <a:r>
-              <a:rPr lang="en-US" sz="2800" dirty="0" smtClean="0">
-                <a:latin typeface="Georgia"/>
-                <a:cs typeface="Georgia"/>
-              </a:rPr>
               <a:t> </a:t>
             </a:r>
             <a:r>
-              <a:rPr lang="en-US" sz="2800" dirty="0" smtClean="0">
-                <a:latin typeface="Georgia"/>
-                <a:cs typeface="Georgia"/>
-              </a:rPr>
-              <a:t> primarily by</a:t>
-            </a:r>
-            <a:r>
-              <a:rPr lang="en-US" sz="2800" dirty="0" smtClean="0">
-                <a:latin typeface="Georgia"/>
-                <a:cs typeface="Georgia"/>
-              </a:rPr>
-              <a:t>  </a:t>
-            </a:r>
-            <a:r>
-              <a:rPr lang="en-US" sz="2800" dirty="0" smtClean="0"/>
-              <a:t>UK EPSRC grant number GR/D0766171/1 (via </a:t>
-            </a:r>
-            <a:r>
-              <a:rPr lang="en-US" sz="2800" dirty="0" smtClean="0"/>
-              <a:t>OMII-UK)</a:t>
-            </a:r>
-            <a:r>
-              <a:rPr lang="en-US" sz="2800" dirty="0" smtClean="0">
-                <a:latin typeface="Georgia"/>
-                <a:cs typeface="Georgia"/>
-              </a:rPr>
-              <a:t>  and </a:t>
-            </a:r>
-            <a:r>
-              <a:rPr lang="en-US" sz="2800" dirty="0" smtClean="0">
-                <a:latin typeface="Georgia"/>
-                <a:cs typeface="Georgia"/>
-              </a:rPr>
-              <a:t>in part by </a:t>
-            </a:r>
-            <a:r>
-              <a:rPr lang="en-US" sz="2800" dirty="0" smtClean="0">
-                <a:latin typeface="Georgia"/>
-                <a:cs typeface="Georgia"/>
-              </a:rPr>
-              <a:t>NSF</a:t>
-            </a:r>
-            <a:r>
-              <a:rPr lang="en-US" sz="2800" dirty="0" smtClean="0">
-                <a:latin typeface="Georgia"/>
-                <a:cs typeface="Georgia"/>
-              </a:rPr>
-              <a:t>, the Louisiana Board-of-Regents and CCT funds.</a:t>
+              <a:rPr lang="en-US" sz="3600" dirty="0" smtClean="0">
+                <a:latin typeface="Georgia"/>
+                <a:cs typeface="Georgia"/>
+              </a:rPr>
+              <a:t>This work was supported  primarily by  </a:t>
+            </a:r>
+            <a:r>
+              <a:rPr lang="en-US" sz="3600" dirty="0" smtClean="0"/>
+              <a:t>UK EPSRC grant number GR/D0766171/1 (via OMII-UK)</a:t>
+            </a:r>
+            <a:r>
+              <a:rPr lang="en-US" sz="3600" dirty="0" smtClean="0">
+                <a:latin typeface="Georgia"/>
+                <a:cs typeface="Georgia"/>
+              </a:rPr>
+              <a:t>  and in part by NSF, the </a:t>
+            </a:r>
+            <a:r>
+              <a:rPr lang="en-US" sz="3600" dirty="0" smtClean="0">
+                <a:latin typeface="Georgia"/>
+                <a:cs typeface="Georgia"/>
+              </a:rPr>
+              <a:t>La Board</a:t>
+            </a:r>
+            <a:r>
+              <a:rPr lang="en-US" sz="3600" dirty="0" smtClean="0">
+                <a:latin typeface="Georgia"/>
+                <a:cs typeface="Georgia"/>
+              </a:rPr>
+              <a:t>-of-Regents and CCT funds.</a:t>
             </a:r>
           </a:p>
         </p:txBody>
@@ -5241,8 +5199,8 @@
         </p:nvSpPr>
         <p:spPr bwMode="auto">
           <a:xfrm>
-            <a:off x="29265568" y="12938860"/>
-            <a:ext cx="13716000" cy="11468660"/>
+            <a:off x="29265568" y="5029200"/>
+            <a:ext cx="13716000" cy="19378319"/>
           </a:xfrm>
           <a:prstGeom prst="roundRect">
             <a:avLst>
@@ -5275,37 +5233,7 @@
                 <a:spcPts val="1800"/>
               </a:spcAft>
             </a:pPr>
-            <a:r>
-              <a:rPr lang="en-US" sz="5400" b="1" dirty="0" smtClean="0">
-                <a:solidFill>
-                  <a:srgbClr val="000099"/>
-                </a:solidFill>
-                <a:latin typeface="Tahoma"/>
-                <a:cs typeface="Tahoma"/>
-              </a:rPr>
-              <a:t>Enabling </a:t>
-            </a:r>
-            <a:r>
-              <a:rPr lang="en-US" sz="5400" b="1" dirty="0" err="1" smtClean="0">
-                <a:solidFill>
-                  <a:srgbClr val="000099"/>
-                </a:solidFill>
-                <a:latin typeface="Tahoma"/>
-                <a:cs typeface="Tahoma"/>
-              </a:rPr>
-              <a:t>e</a:t>
-            </a:r>
-            <a:r>
-              <a:rPr lang="en-US" sz="5400" b="1" dirty="0" smtClean="0">
-                <a:solidFill>
-                  <a:srgbClr val="000099"/>
-                </a:solidFill>
-                <a:latin typeface="Tahoma"/>
-                <a:cs typeface="Tahoma"/>
-              </a:rPr>
-              <a:t>-Research</a:t>
-            </a:r>
-            <a:endParaRPr lang="en-US" sz="4000" b="1" dirty="0" smtClean="0">
+            <a:endParaRPr lang="en-US" sz="5400" b="1" dirty="0" smtClean="0">
               <a:solidFill>
                 <a:srgbClr val="000099"/>
               </a:solidFill>
@@ -5314,7 +5242,7 @@
             </a:endParaRPr>
           </a:p>
           <a:p>
-            <a:pPr algn="just">
+            <a:pPr algn="ctr">
               <a:lnSpc>
                 <a:spcPct val="130000"/>
               </a:lnSpc>
@@ -5322,90 +5250,64 @@
                 <a:spcPts val="1800"/>
               </a:spcAft>
             </a:pPr>
-            <a:r>
-              <a:rPr lang="en-US" sz="2800" dirty="0" smtClean="0">
-                <a:latin typeface="Georgia"/>
-                <a:cs typeface="Georgia"/>
-              </a:rPr>
-              <a:t>SAGA is being used</a:t>
-            </a:r>
-            <a:r>
-              <a:rPr lang="en-US" sz="2800" dirty="0" smtClean="0">
-                <a:latin typeface="Georgia"/>
-                <a:cs typeface="Georgia"/>
-              </a:rPr>
-              <a:t> </a:t>
-            </a:r>
-            <a:r>
-              <a:rPr lang="en-US" sz="2800" dirty="0" smtClean="0">
-                <a:latin typeface="Georgia"/>
-                <a:cs typeface="Georgia"/>
-              </a:rPr>
-              <a:t>to facilitating the uptake of distributed infrastructure and development of distribute applications </a:t>
-            </a:r>
-            <a:r>
-              <a:rPr lang="en-US" sz="2800" dirty="0" smtClean="0">
-                <a:latin typeface="Georgia"/>
-                <a:cs typeface="Georgia"/>
-              </a:rPr>
-              <a:t>in </a:t>
-            </a:r>
-            <a:r>
-              <a:rPr lang="en-US" sz="2800" dirty="0" smtClean="0">
-                <a:latin typeface="Georgia"/>
-                <a:cs typeface="Georgia"/>
-              </a:rPr>
-              <a:t>several critical ways:</a:t>
-            </a:r>
-            <a:endParaRPr lang="en-US" sz="2800" dirty="0" smtClean="0">
-              <a:latin typeface="Georgia"/>
-              <a:cs typeface="Georgia"/>
+            <a:endParaRPr lang="en-US" sz="5400" b="1" dirty="0" smtClean="0">
+              <a:solidFill>
+                <a:srgbClr val="000099"/>
+              </a:solidFill>
+              <a:latin typeface="Tahoma"/>
+              <a:cs typeface="Tahoma"/>
             </a:endParaRPr>
           </a:p>
           <a:p>
-            <a:pPr marL="457200" indent="-457200" algn="just">
+            <a:pPr algn="ctr">
               <a:lnSpc>
                 <a:spcPct val="130000"/>
               </a:lnSpc>
               <a:spcAft>
                 <a:spcPts val="1800"/>
               </a:spcAft>
-              <a:buFont typeface="Courier New"/>
-              <a:buChar char="o"/>
-            </a:pPr>
-            <a:r>
-              <a:rPr lang="en-US" sz="2800" dirty="0" smtClean="0">
-                <a:latin typeface="Georgia"/>
-                <a:cs typeface="Georgia"/>
-              </a:rPr>
-              <a:t>….  In </a:t>
-            </a:r>
-            <a:r>
-              <a:rPr lang="en-US" sz="2800" dirty="0" smtClean="0">
-                <a:latin typeface="Georgia"/>
-                <a:cs typeface="Georgia"/>
-              </a:rPr>
-              <a:t>particular it can be used to support specific application usage patterns, for example, it has been used for distributed replica-exchange (RE) simulations using NAMD. The same  infrastructure can be used for use with other codes such as LAMMPS, etc. The figure above provides  details on how SAGA is used to implement RE</a:t>
-            </a:r>
-            <a:r>
-              <a:rPr lang="en-US" sz="2800" dirty="0" smtClean="0">
-                <a:latin typeface="Georgia"/>
-                <a:cs typeface="Georgia"/>
-              </a:rPr>
-              <a:t>.</a:t>
-            </a:r>
-          </a:p>
-          <a:p>
-            <a:pPr marL="457200" indent="-457200" algn="just">
+            </a:pPr>
+            <a:endParaRPr lang="en-US" sz="5400" b="1" dirty="0" smtClean="0">
+              <a:solidFill>
+                <a:srgbClr val="000099"/>
+              </a:solidFill>
+              <a:latin typeface="Tahoma"/>
+              <a:cs typeface="Tahoma"/>
+            </a:endParaRPr>
+          </a:p>
+          <a:p>
+            <a:pPr algn="ctr">
               <a:lnSpc>
                 <a:spcPct val="130000"/>
               </a:lnSpc>
               <a:spcAft>
                 <a:spcPts val="1800"/>
               </a:spcAft>
-              <a:buFont typeface="Courier New"/>
-              <a:buChar char="o"/>
-            </a:pPr>
+            </a:pPr>
+            <a:endParaRPr lang="en-US" sz="5400" b="1" dirty="0" smtClean="0">
+              <a:solidFill>
+                <a:srgbClr val="000099"/>
+              </a:solidFill>
+              <a:latin typeface="Tahoma"/>
+              <a:cs typeface="Tahoma"/>
+            </a:endParaRPr>
+          </a:p>
+          <a:p>
+            <a:pPr algn="ctr">
+              <a:lnSpc>
+                <a:spcPct val="130000"/>
+              </a:lnSpc>
+              <a:spcAft>
+                <a:spcPts val="1800"/>
+              </a:spcAft>
+            </a:pPr>
+            <a:r>
+              <a:rPr lang="en-US" sz="2800" dirty="0" smtClean="0">
+                <a:latin typeface="Georgia"/>
+                <a:cs typeface="Georgia"/>
+              </a:rPr>
+              <a:t>.</a:t>
+            </a:r>
             <a:endParaRPr lang="en-US" sz="2800" dirty="0" smtClean="0">
               <a:latin typeface="Georgia"/>
               <a:cs typeface="Georgia"/>
@@ -5423,8 +5325,8 @@
         </p:nvSpPr>
         <p:spPr bwMode="auto">
           <a:xfrm>
-            <a:off x="14398540" y="12938859"/>
-            <a:ext cx="14336889" cy="8155423"/>
+            <a:off x="14398540" y="5105400"/>
+            <a:ext cx="14336889" cy="16066008"/>
           </a:xfrm>
           <a:prstGeom prst="roundRect">
             <a:avLst>
@@ -5467,6 +5369,13 @@
               </a:rPr>
               <a:t>Simple, Powerful Abstraction Layer</a:t>
             </a:r>
+            <a:endParaRPr lang="en-US" sz="5400" b="1" dirty="0" smtClean="0">
+              <a:solidFill>
+                <a:srgbClr val="000099"/>
+              </a:solidFill>
+              <a:latin typeface="Tahoma"/>
+              <a:cs typeface="Tahoma"/>
+            </a:endParaRPr>
           </a:p>
           <a:p>
             <a:pPr algn="just">
@@ -5482,8 +5391,75 @@
                 <a:latin typeface="Georgia"/>
                 <a:cs typeface="Georgia"/>
               </a:rPr>
-              <a:t>SAGA facilitates the use of distributed infrastructure by providing a simple interface across different middleware distributions and environments. Therefore once an application has been written using SAGA it can be deployed and run on any environment in which SAGA is supported.</a:t>
-            </a:r>
+              <a:t>SAGA provides a simple,  powerful, programmatic interface. </a:t>
+            </a:r>
+            <a:r>
+              <a:rPr lang="en-US" sz="2800" dirty="0" smtClean="0">
+                <a:latin typeface="Georgia"/>
+                <a:cs typeface="Georgia"/>
+              </a:rPr>
+              <a:t>Additionally, SAGA provides the  abstractions from which commonly occurring patterns and usage modes  can be supported. </a:t>
+            </a:r>
+            <a:r>
+              <a:rPr lang="en-US" sz="2800" dirty="0" smtClean="0">
+                <a:latin typeface="Georgia"/>
+                <a:cs typeface="Georgia"/>
+              </a:rPr>
+              <a:t> Thus SAGA is </a:t>
+            </a:r>
+            <a:r>
+              <a:rPr lang="en-US" sz="2800" dirty="0" smtClean="0">
+                <a:latin typeface="Georgia"/>
+                <a:cs typeface="Georgia"/>
+              </a:rPr>
+              <a:t>being used to </a:t>
+            </a:r>
+            <a:r>
+              <a:rPr lang="en-US" sz="2800" dirty="0" smtClean="0">
+                <a:latin typeface="Georgia"/>
+                <a:cs typeface="Georgia"/>
+              </a:rPr>
+              <a:t>facilitate </a:t>
+            </a:r>
+            <a:r>
+              <a:rPr lang="en-US" sz="2800" dirty="0" smtClean="0">
+                <a:latin typeface="Georgia"/>
+                <a:cs typeface="Georgia"/>
+              </a:rPr>
+              <a:t>the uptake of distributed infrastructure and development of </a:t>
+            </a:r>
+            <a:r>
+              <a:rPr lang="en-US" sz="2800" dirty="0" smtClean="0">
+                <a:latin typeface="Georgia"/>
+                <a:cs typeface="Georgia"/>
+              </a:rPr>
+              <a:t>distributed </a:t>
+            </a:r>
+            <a:r>
+              <a:rPr lang="en-US" sz="2800" dirty="0" smtClean="0">
+                <a:latin typeface="Georgia"/>
+                <a:cs typeface="Georgia"/>
+              </a:rPr>
+              <a:t>applications in several critical </a:t>
+            </a:r>
+            <a:r>
+              <a:rPr lang="en-US" sz="2800" dirty="0" smtClean="0">
+                <a:latin typeface="Georgia"/>
+                <a:cs typeface="Georgia"/>
+              </a:rPr>
+              <a:t>ways. See figures below. For </a:t>
+            </a:r>
+            <a:r>
+              <a:rPr lang="en-US" sz="2800" dirty="0" smtClean="0">
+                <a:latin typeface="Georgia"/>
+                <a:cs typeface="Georgia"/>
+              </a:rPr>
+              <a:t>example:</a:t>
+            </a:r>
+            <a:endParaRPr lang="en-US" sz="2800" dirty="0" smtClean="0">
+              <a:latin typeface="Georgia"/>
+              <a:cs typeface="Georgia"/>
+            </a:endParaRPr>
           </a:p>
           <a:p>
             <a:pPr algn="just">
@@ -5493,13 +5469,179 @@
               <a:spcAft>
                 <a:spcPts val="1800"/>
               </a:spcAft>
+              <a:buFont typeface="Arial"/>
+              <a:buChar char="•"/>
             </a:pPr>
             <a:r>
               <a:rPr lang="en-US" sz="2800" dirty="0" smtClean="0">
                 <a:latin typeface="Georgia"/>
                 <a:cs typeface="Georgia"/>
               </a:rPr>
-              <a:t>We are developing adaptors for the most commonly occurring distributed environments.  Additionally SAGA provides the  abstractions from which commonly occurring execution patterns and usage modes  can be supported. For example for data-intensive applications, we create a framework that supports the common </a:t>
+              <a:t> </a:t>
+            </a:r>
+            <a:r>
+              <a:rPr lang="en-US" sz="2800" dirty="0" smtClean="0">
+                <a:latin typeface="Georgia"/>
+                <a:cs typeface="Georgia"/>
+              </a:rPr>
+              <a:t>SAGA provides a single-interface across different middleware distributions and </a:t>
+            </a:r>
+            <a:r>
+              <a:rPr lang="en-US" sz="2800" dirty="0" smtClean="0">
+                <a:latin typeface="Georgia"/>
+                <a:cs typeface="Georgia"/>
+              </a:rPr>
+              <a:t>environments. SAGA provides </a:t>
+            </a:r>
+            <a:r>
+              <a:rPr lang="en-US" sz="2800" dirty="0" smtClean="0">
+                <a:latin typeface="Georgia"/>
+                <a:cs typeface="Georgia"/>
+              </a:rPr>
+              <a:t>adaptors </a:t>
+            </a:r>
+            <a:r>
+              <a:rPr lang="en-US" sz="2800" dirty="0" smtClean="0">
+                <a:latin typeface="Georgia"/>
+                <a:cs typeface="Georgia"/>
+              </a:rPr>
+              <a:t>for the most commonly occurring distributed </a:t>
+            </a:r>
+            <a:r>
+              <a:rPr lang="en-US" sz="2800" dirty="0" smtClean="0">
+                <a:latin typeface="Georgia"/>
+                <a:cs typeface="Georgia"/>
+              </a:rPr>
+              <a:t>environments</a:t>
+            </a:r>
+            <a:r>
+              <a:rPr lang="en-US" sz="2800" dirty="0" smtClean="0">
+                <a:latin typeface="Georgia"/>
+                <a:cs typeface="Georgia"/>
+              </a:rPr>
+              <a:t>.</a:t>
+            </a:r>
+            <a:r>
+              <a:rPr lang="en-US" sz="2800" dirty="0" smtClean="0">
+                <a:latin typeface="Georgia"/>
+                <a:cs typeface="Georgia"/>
+              </a:rPr>
+              <a:t> This enables the </a:t>
+            </a:r>
+            <a:r>
+              <a:rPr lang="en-US" sz="2800" dirty="0" smtClean="0">
+                <a:latin typeface="Georgia"/>
+                <a:cs typeface="Georgia"/>
+              </a:rPr>
+              <a:t>use of distributed infrastructure </a:t>
+            </a:r>
+            <a:r>
+              <a:rPr lang="en-US" sz="2800" dirty="0" smtClean="0">
+                <a:latin typeface="Georgia"/>
+                <a:cs typeface="Georgia"/>
+              </a:rPr>
+              <a:t>by. Therefore </a:t>
+            </a:r>
+            <a:r>
+              <a:rPr lang="en-US" sz="2800" dirty="0" smtClean="0">
+                <a:latin typeface="Georgia"/>
+                <a:cs typeface="Georgia"/>
+              </a:rPr>
+              <a:t>once an application has been written using SAGA it can be deployed and run on any environment in which SAGA is supported</a:t>
+            </a:r>
+            <a:r>
+              <a:rPr lang="en-US" sz="2800" dirty="0" smtClean="0">
+                <a:latin typeface="Georgia"/>
+                <a:cs typeface="Georgia"/>
+              </a:rPr>
+              <a:t>.</a:t>
+            </a:r>
+          </a:p>
+          <a:p>
+            <a:pPr algn="just">
+              <a:lnSpc>
+                <a:spcPct val="130000"/>
+              </a:lnSpc>
+              <a:spcAft>
+                <a:spcPts val="1800"/>
+              </a:spcAft>
+              <a:buFont typeface="Arial"/>
+              <a:buChar char="•"/>
+            </a:pPr>
+            <a:r>
+              <a:rPr lang="en-US" sz="2800" dirty="0" smtClean="0">
+                <a:latin typeface="Georgia"/>
+                <a:cs typeface="Georgia"/>
+              </a:rPr>
+              <a:t> SAGA provides the ability to support different distributed applications types and their </a:t>
+            </a:r>
+            <a:r>
+              <a:rPr lang="en-US" sz="2800" i="1" dirty="0" smtClean="0">
+                <a:latin typeface="Georgia"/>
+                <a:cs typeface="Georgia"/>
+              </a:rPr>
+              <a:t>usage modes</a:t>
+            </a:r>
+            <a:r>
+              <a:rPr lang="en-US" sz="2800" dirty="0" smtClean="0">
+                <a:latin typeface="Georgia"/>
+                <a:cs typeface="Georgia"/>
+              </a:rPr>
+              <a:t>.  For example, a common characteristic of applications is existence of multiple sub-jobs and the need to launch and coordinate  these sub-jobs. These sub-jobs might be either identical (replicas) or different, and could be either </a:t>
+            </a:r>
+            <a:r>
+              <a:rPr lang="en-US" sz="2800" dirty="0" smtClean="0">
+                <a:latin typeface="Georgia"/>
+                <a:cs typeface="Georgia"/>
+              </a:rPr>
+              <a:t>loosely-</a:t>
+            </a:r>
+            <a:r>
+              <a:rPr lang="en-US" sz="2800" dirty="0" smtClean="0">
+                <a:latin typeface="Georgia"/>
+                <a:cs typeface="Georgia"/>
+              </a:rPr>
+              <a:t>coupled or de-coupled. SAGA supports these different application classes and usage modes by providing support for  hierarchical job-submission patterns, migration, and bulk submission  amongst others functionality. Other usage modes supported include Master-Worker.</a:t>
+            </a:r>
+          </a:p>
+          <a:p>
+            <a:pPr algn="just">
+              <a:lnSpc>
+                <a:spcPct val="130000"/>
+              </a:lnSpc>
+              <a:spcAft>
+                <a:spcPts val="1800"/>
+              </a:spcAft>
+              <a:buFont typeface="Arial"/>
+              <a:buChar char="•"/>
+            </a:pPr>
+            <a:r>
+              <a:rPr lang="en-US" sz="2800" dirty="0" smtClean="0">
+                <a:latin typeface="Georgia"/>
+                <a:cs typeface="Georgia"/>
+              </a:rPr>
+              <a:t> </a:t>
+            </a:r>
+            <a:r>
+              <a:rPr lang="en-US" sz="2800" dirty="0" smtClean="0">
+                <a:latin typeface="Georgia"/>
+                <a:cs typeface="Georgia"/>
+              </a:rPr>
+              <a:t>F</a:t>
+            </a:r>
+            <a:r>
+              <a:rPr lang="en-US" sz="2800" dirty="0" smtClean="0">
+                <a:latin typeface="Georgia"/>
+                <a:cs typeface="Georgia"/>
+              </a:rPr>
+              <a:t>or </a:t>
+            </a:r>
+            <a:r>
+              <a:rPr lang="en-US" sz="2800" dirty="0" smtClean="0">
+                <a:latin typeface="Georgia"/>
+                <a:cs typeface="Georgia"/>
+              </a:rPr>
+              <a:t>data-intensive applications, we create a framework that supports the common </a:t>
             </a:r>
             <a:r>
               <a:rPr lang="en-US" sz="2800" dirty="0" err="1" smtClean="0">
@@ -5513,8 +5655,49 @@
                 <a:latin typeface="Georgia"/>
                 <a:cs typeface="Georgia"/>
               </a:rPr>
-              <a:t> pattern. Applications involving basic functionality such as searching, can then be deployed over distributed environments</a:t>
-            </a:r>
+              <a:t> </a:t>
+            </a:r>
+            <a:r>
+              <a:rPr lang="en-US" sz="2800" i="1" dirty="0" smtClean="0">
+                <a:latin typeface="Georgia"/>
+                <a:cs typeface="Georgia"/>
+              </a:rPr>
+              <a:t>pattern. </a:t>
+            </a:r>
+            <a:r>
+              <a:rPr lang="en-US" sz="2800" dirty="0" smtClean="0">
+                <a:latin typeface="Georgia"/>
+                <a:cs typeface="Georgia"/>
+              </a:rPr>
+              <a:t>There are </a:t>
+            </a:r>
+            <a:r>
+              <a:rPr lang="en-US" sz="2800" dirty="0" smtClean="0">
+                <a:latin typeface="Georgia"/>
+                <a:cs typeface="Georgia"/>
+              </a:rPr>
+              <a:t>many other patterns that can be created in a infrastructure-independent manner, thus enabling traditional applications (such as sequence alignment and searching) to be reformulated to use these patterns and exploit distributed infrastructure. </a:t>
+            </a:r>
+            <a:endParaRPr lang="en-US" sz="2800" dirty="0" smtClean="0">
+              <a:latin typeface="Georgia"/>
+              <a:cs typeface="Georgia"/>
+            </a:endParaRPr>
+          </a:p>
+          <a:p>
+            <a:pPr algn="just">
+              <a:lnSpc>
+                <a:spcPct val="130000"/>
+              </a:lnSpc>
+              <a:spcAft>
+                <a:spcPts val="1800"/>
+              </a:spcAft>
+              <a:buFont typeface="Arial"/>
+              <a:buChar char="•"/>
+            </a:pPr>
+            <a:endParaRPr lang="en-US" sz="2800" dirty="0" smtClean="0">
+              <a:latin typeface="Georgia"/>
+              <a:cs typeface="Georgia"/>
+            </a:endParaRPr>
           </a:p>
         </p:txBody>
       </p:sp>
@@ -5529,7 +5712,7 @@
         <mc:AlternateContent>
           <mc:Choice xmlns:ma="http://schemas.microsoft.com/office/mac/drawingml/2008/main" Requires="ma">
             <p:blipFill>
-              <a:blip r:embed="rId5"/>
+              <a:blip r:embed="rId6"/>
               <a:stretch>
                 <a:fillRect/>
               </a:stretch>
@@ -5537,7 +5720,7 @@
           </mc:Choice>
           <mc:Fallback>
             <p:blipFill>
-              <a:blip r:embed="rId6"/>
+              <a:blip r:embed="rId7"/>
               <a:stretch>
                 <a:fillRect/>
               </a:stretch>
@@ -5546,7 +5729,7 @@
         </mc:AlternateContent>
         <p:spPr>
           <a:xfrm>
-            <a:off x="1905000" y="21833807"/>
+            <a:off x="1828800" y="22786217"/>
             <a:ext cx="25831800" cy="7541383"/>
           </a:xfrm>
           <a:prstGeom prst="rect">
@@ -5554,6 +5737,293 @@
           </a:prstGeom>
         </p:spPr>
       </p:pic>
+      <p:pic>
+        <p:nvPicPr>
+          <p:cNvPr id="24" name="Picture 23" descr="remdmanager_v11.pdf"/>
+          <p:cNvPicPr>
+            <a:picLocks noChangeAspect="1"/>
+          </p:cNvPicPr>
+          <p:nvPr/>
+        </p:nvPicPr>
+        <mc:AlternateContent>
+          <mc:Choice xmlns:ma="http://schemas.microsoft.com/office/mac/drawingml/2008/main" Requires="ma">
+            <p:blipFill>
+              <a:blip r:embed="rId8"/>
+              <a:stretch>
+                <a:fillRect/>
+              </a:stretch>
+            </p:blipFill>
+          </mc:Choice>
+          <mc:Fallback>
+            <p:blipFill>
+              <a:blip r:embed="rId9"/>
+              <a:stretch>
+                <a:fillRect/>
+              </a:stretch>
+            </p:blipFill>
+          </mc:Fallback>
+        </mc:AlternateContent>
+        <p:spPr>
+          <a:xfrm>
+            <a:off x="30403800" y="18059400"/>
+            <a:ext cx="11843939" cy="5791200"/>
+          </a:xfrm>
+          <a:prstGeom prst="rect">
+            <a:avLst/>
+          </a:prstGeom>
+        </p:spPr>
+      </p:pic>
+      <p:sp>
+        <p:nvSpPr>
+          <p:cNvPr id="25" name="TextBox 24"/>
+          <p:cNvSpPr txBox="1"/>
+          <p:nvPr/>
+        </p:nvSpPr>
+        <p:spPr>
+          <a:xfrm>
+            <a:off x="29718000" y="5562600"/>
+            <a:ext cx="12801600" cy="12314144"/>
+          </a:xfrm>
+          <a:prstGeom prst="rect">
+            <a:avLst/>
+          </a:prstGeom>
+          <a:noFill/>
+        </p:spPr>
+        <p:txBody>
+          <a:bodyPr wrap="square" rtlCol="0">
+            <a:spAutoFit/>
+          </a:bodyPr>
+          <a:lstStyle/>
+          <a:p>
+            <a:pPr algn="ctr">
+              <a:lnSpc>
+                <a:spcPct val="130000"/>
+              </a:lnSpc>
+              <a:spcAft>
+                <a:spcPts val="1800"/>
+              </a:spcAft>
+            </a:pPr>
+            <a:r>
+              <a:rPr lang="en-US" sz="5400" b="1" dirty="0" smtClean="0">
+                <a:solidFill>
+                  <a:srgbClr val="000099"/>
+                </a:solidFill>
+                <a:latin typeface="Tahoma"/>
+                <a:cs typeface="Tahoma"/>
+              </a:rPr>
+              <a:t>Enabling</a:t>
+            </a:r>
+            <a:r>
+              <a:rPr lang="en-US" sz="5400" b="1" dirty="0" smtClean="0">
+                <a:solidFill>
+                  <a:srgbClr val="000099"/>
+                </a:solidFill>
+                <a:latin typeface="Tahoma"/>
+                <a:cs typeface="Tahoma"/>
+              </a:rPr>
+              <a:t> Distributed Applications</a:t>
+            </a:r>
+          </a:p>
+          <a:p>
+            <a:pPr algn="just">
+              <a:lnSpc>
+                <a:spcPct val="130000"/>
+              </a:lnSpc>
+              <a:spcAft>
+                <a:spcPts val="1800"/>
+              </a:spcAft>
+            </a:pPr>
+            <a:r>
+              <a:rPr lang="en-US" sz="3200" dirty="0" smtClean="0">
+                <a:latin typeface="Georgia"/>
+                <a:cs typeface="Georgia"/>
+              </a:rPr>
+              <a:t>SAGA can support a wide range of  applications types. Here we discuss three specific applications, belonging to difference categories, that we have developed using SAGA: </a:t>
+            </a:r>
+          </a:p>
+          <a:p>
+            <a:pPr marL="457200" indent="-457200" algn="just">
+              <a:lnSpc>
+                <a:spcPct val="130000"/>
+              </a:lnSpc>
+              <a:spcAft>
+                <a:spcPts val="1800"/>
+              </a:spcAft>
+              <a:buFont typeface="Courier New"/>
+              <a:buChar char="o"/>
+            </a:pPr>
+            <a:r>
+              <a:rPr lang="en-US" sz="3200" dirty="0" smtClean="0">
+                <a:latin typeface="Georgia"/>
+                <a:cs typeface="Georgia"/>
+              </a:rPr>
+              <a:t>Providing “Legacy Applications” with novel, agile, distributed execution modes. For example, we have  re-architected a </a:t>
+            </a:r>
+            <a:r>
+              <a:rPr lang="en-US" sz="3200" dirty="0" err="1" smtClean="0">
+                <a:latin typeface="Georgia"/>
+                <a:cs typeface="Georgia"/>
+              </a:rPr>
+              <a:t>Kalman</a:t>
+            </a:r>
+            <a:r>
+              <a:rPr lang="en-US" sz="3200" dirty="0" smtClean="0">
+                <a:latin typeface="Georgia"/>
+                <a:cs typeface="Georgia"/>
+              </a:rPr>
+              <a:t>-Filter based application to enable it to determine at run time, the optimal resource to launch sub-jobs and to be able to dynamically  exploit multiple resources concurrently without prior arrangement. </a:t>
+            </a:r>
+          </a:p>
+          <a:p>
+            <a:pPr marL="457200" indent="-457200" algn="just">
+              <a:lnSpc>
+                <a:spcPct val="130000"/>
+              </a:lnSpc>
+              <a:spcAft>
+                <a:spcPts val="1800"/>
+              </a:spcAft>
+              <a:buFont typeface="Courier New"/>
+              <a:buChar char="o"/>
+            </a:pPr>
+            <a:r>
+              <a:rPr lang="en-US" sz="3200" dirty="0" smtClean="0">
+                <a:latin typeface="Georgia"/>
+                <a:cs typeface="Georgia"/>
+              </a:rPr>
+              <a:t>Novel applications written for </a:t>
+            </a:r>
+            <a:r>
+              <a:rPr lang="en-US" sz="3200" i="1" dirty="0" smtClean="0">
+                <a:latin typeface="Georgia"/>
+                <a:cs typeface="Georgia"/>
+              </a:rPr>
+              <a:t>explicit</a:t>
+            </a:r>
+            <a:r>
+              <a:rPr lang="en-US" sz="3200" dirty="0" smtClean="0">
+                <a:latin typeface="Georgia"/>
+                <a:cs typeface="Georgia"/>
+              </a:rPr>
+              <a:t> deployment on distributed infrastructure, i.e. first-principles distributed application [Ref 3,4]</a:t>
+            </a:r>
+          </a:p>
+          <a:p>
+            <a:pPr marL="457200" indent="-457200" algn="just">
+              <a:lnSpc>
+                <a:spcPct val="130000"/>
+              </a:lnSpc>
+              <a:spcAft>
+                <a:spcPts val="1800"/>
+              </a:spcAft>
+              <a:buFont typeface="Courier New"/>
+              <a:buChar char="o"/>
+            </a:pPr>
+            <a:r>
+              <a:rPr lang="en-US" sz="3200" dirty="0" smtClean="0">
+                <a:latin typeface="Georgia"/>
+                <a:cs typeface="Georgia"/>
+              </a:rPr>
+              <a:t>Expose “Legacy Applications” to distributed environments. In this approach, application kernels are </a:t>
+            </a:r>
+            <a:r>
+              <a:rPr lang="en-US" sz="3200" i="1" dirty="0" smtClean="0">
+                <a:latin typeface="Georgia"/>
+                <a:cs typeface="Georgia"/>
+              </a:rPr>
+              <a:t>implicitly </a:t>
+            </a:r>
+            <a:r>
+              <a:rPr lang="en-US" sz="3200" dirty="0" smtClean="0">
+                <a:latin typeface="Georgia"/>
+                <a:cs typeface="Georgia"/>
+              </a:rPr>
+              <a:t>deployed while the orchestration/management is done using agents written in SAGA. This approach has been used to implement distributed replica exchange (RE), and the time-to-solution  (</a:t>
+            </a:r>
+            <a:r>
+              <a:rPr lang="en-US" sz="3200" dirty="0" err="1" smtClean="0">
+                <a:latin typeface="Georgia"/>
+                <a:cs typeface="Georgia"/>
+              </a:rPr>
+              <a:t>ie</a:t>
+            </a:r>
+            <a:r>
+              <a:rPr lang="en-US" sz="3200" dirty="0" smtClean="0">
+                <a:latin typeface="Georgia"/>
+                <a:cs typeface="Georgia"/>
+              </a:rPr>
+              <a:t>. # of exchanges) decreases with increasing number of distributed resources </a:t>
+            </a:r>
+            <a:r>
+              <a:rPr lang="en-US" sz="3200" dirty="0" err="1" smtClean="0">
+                <a:latin typeface="Georgia"/>
+                <a:cs typeface="Georgia"/>
+              </a:rPr>
+              <a:t>utilised</a:t>
+            </a:r>
+            <a:r>
+              <a:rPr lang="en-US" sz="3200" dirty="0" smtClean="0">
+                <a:latin typeface="Georgia"/>
+                <a:cs typeface="Georgia"/>
+              </a:rPr>
+              <a:t>.</a:t>
+            </a:r>
+            <a:endParaRPr lang="en-US" sz="3200" i="1" dirty="0" smtClean="0">
+              <a:latin typeface="Georgia"/>
+              <a:cs typeface="Georgia"/>
+            </a:endParaRPr>
+          </a:p>
+        </p:txBody>
+      </p:sp>
+      <p:pic>
+        <p:nvPicPr>
+          <p:cNvPr id="26" name="Picture 25"/>
+          <p:cNvPicPr>
+            <a:picLocks noChangeAspect="1"/>
+          </p:cNvPicPr>
+          <p:nvPr/>
+        </p:nvPicPr>
+        <p:blipFill>
+          <a:blip r:embed="rId10"/>
+          <a:stretch>
+            <a:fillRect/>
+          </a:stretch>
+        </p:blipFill>
+        <p:spPr>
+          <a:xfrm>
+            <a:off x="37871400" y="1188720"/>
+            <a:ext cx="5286509" cy="2011680"/>
+          </a:xfrm>
+          <a:prstGeom prst="rect">
+            <a:avLst/>
+          </a:prstGeom>
+        </p:spPr>
+      </p:pic>
+      <p:sp>
+        <p:nvSpPr>
+          <p:cNvPr id="27" name="TextBox 26"/>
+          <p:cNvSpPr txBox="1"/>
+          <p:nvPr/>
+        </p:nvSpPr>
+        <p:spPr>
+          <a:xfrm>
+            <a:off x="36347400" y="12192000"/>
+            <a:ext cx="184666" cy="1415772"/>
+          </a:xfrm>
+          <a:prstGeom prst="rect">
+            <a:avLst/>
+          </a:prstGeom>
+          <a:noFill/>
+        </p:spPr>
+        <p:txBody>
+          <a:bodyPr wrap="none" rtlCol="0">
+            <a:spAutoFit/>
+          </a:bodyPr>
+          <a:lstStyle/>
+          <a:p>
+            <a:endParaRPr lang="en-US" dirty="0"/>
+          </a:p>
+        </p:txBody>
+      </p:sp>
     </p:spTree>
   </p:cSld>
   <p:clrMapOvr>

</xml_diff>

<commit_message>
Final version. Submitted for printing.
git-svn-id: file://localhost/tmp/svn2git/svn@304 defb5e50-622e-49ec-a68e-d72c7db87b45
</commit_message>
<xml_diff>
--- a/papers/cybertools08_poster/ahm08_poster.pptx
+++ b/papers/cybertools08_poster/ahm08_poster.pptx
@@ -4030,7 +4030,7 @@
               <a:defRPr/>
             </a:pPr>
             <a:r>
-              <a:rPr lang="en-US" altLang="zh-TW" sz="8800" b="1" dirty="0" smtClean="0">
+              <a:rPr lang="en-US" altLang="zh-TW" sz="6000" b="1" dirty="0" smtClean="0">
                 <a:solidFill>
                   <a:srgbClr val="FFFFFF"/>
                 </a:solidFill>
@@ -4045,7 +4045,7 @@
               <a:t>Enabling Distributed Applications with SAGA</a:t>
             </a:r>
             <a:r>
-              <a:rPr lang="en-US" altLang="zh-TW" sz="8800" dirty="0" smtClean="0">
+              <a:rPr lang="en-US" altLang="zh-TW" sz="3556" dirty="0" smtClean="0">
                 <a:solidFill>
                   <a:srgbClr val="FFFFFF"/>
                 </a:solidFill>
@@ -4060,7 +4060,7 @@
               <a:t/>
             </a:r>
             <a:br>
-              <a:rPr lang="en-US" altLang="zh-TW" sz="8800" dirty="0" smtClean="0">
+              <a:rPr lang="en-US" altLang="zh-TW" sz="3556" dirty="0" smtClean="0">
                 <a:solidFill>
                   <a:srgbClr val="FFFFFF"/>
                 </a:solidFill>
@@ -4074,7 +4074,7 @@
               </a:rPr>
             </a:br>
             <a:r>
-              <a:rPr lang="en-US" altLang="zh-TW" sz="4800" b="1" dirty="0" smtClean="0">
+              <a:rPr lang="en-US" altLang="zh-TW" sz="3556" b="1" dirty="0" smtClean="0">
                 <a:solidFill>
                   <a:schemeClr val="bg1"/>
                 </a:solidFill>
@@ -4089,7 +4089,7 @@
               <a:t>Shantenu Jha</a:t>
             </a:r>
             <a:r>
-              <a:rPr lang="en-US" altLang="zh-TW" sz="4800" b="1" baseline="30000" dirty="0" smtClean="0">
+              <a:rPr lang="en-US" altLang="zh-TW" sz="3556" b="1" baseline="30000" dirty="0" smtClean="0">
                 <a:solidFill>
                   <a:schemeClr val="bg1"/>
                 </a:solidFill>
@@ -4104,7 +4104,7 @@
               <a:t>12</a:t>
             </a:r>
             <a:r>
-              <a:rPr lang="en-US" altLang="zh-TW" sz="4800" b="1" dirty="0" smtClean="0">
+              <a:rPr lang="en-US" altLang="zh-TW" sz="3556" b="1" dirty="0" smtClean="0">
                 <a:solidFill>
                   <a:schemeClr val="bg1"/>
                 </a:solidFill>
@@ -4119,7 +4119,7 @@
               <a:t>, </a:t>
             </a:r>
             <a:r>
-              <a:rPr lang="en-US" altLang="zh-TW" sz="4800" b="1" dirty="0" err="1" smtClean="0">
+              <a:rPr lang="en-US" altLang="zh-TW" sz="3556" b="1" dirty="0" err="1" smtClean="0">
                 <a:solidFill>
                   <a:schemeClr val="bg1"/>
                 </a:solidFill>
@@ -4134,7 +4134,7 @@
               <a:t>Hartmut</a:t>
             </a:r>
             <a:r>
-              <a:rPr lang="en-US" altLang="zh-TW" sz="4800" b="1" dirty="0" smtClean="0">
+              <a:rPr lang="en-US" altLang="zh-TW" sz="3556" b="1" dirty="0" smtClean="0">
                 <a:solidFill>
                   <a:schemeClr val="bg1"/>
                 </a:solidFill>
@@ -4146,10 +4146,10 @@
                 <a:latin typeface="Tahoma"/>
                 <a:cs typeface="Tahoma"/>
               </a:rPr>
-              <a:t> Kaiser, André </a:t>
-            </a:r>
-            <a:r>
-              <a:rPr lang="en-US" altLang="zh-TW" sz="4800" b="1" dirty="0" err="1" smtClean="0">
+              <a:t> </a:t>
+            </a:r>
+            <a:r>
+              <a:rPr lang="en-US" altLang="zh-TW" sz="3556" b="1" dirty="0" smtClean="0">
                 <a:solidFill>
                   <a:schemeClr val="bg1"/>
                 </a:solidFill>
@@ -4161,10 +4161,10 @@
                 <a:latin typeface="Tahoma"/>
                 <a:cs typeface="Tahoma"/>
               </a:rPr>
-              <a:t>Merzky</a:t>
-            </a:r>
-            <a:r>
-              <a:rPr lang="en-US" altLang="zh-TW" sz="4800" b="1" dirty="0" smtClean="0">
+              <a:t>Kaiser</a:t>
+            </a:r>
+            <a:r>
+              <a:rPr lang="en-US" altLang="zh-TW" sz="3556" b="1" baseline="30000" dirty="0" smtClean="0">
                 <a:solidFill>
                   <a:schemeClr val="bg1"/>
                 </a:solidFill>
@@ -4176,10 +4176,10 @@
                 <a:latin typeface="Tahoma"/>
                 <a:cs typeface="Tahoma"/>
               </a:rPr>
-              <a:t>, Ole Weidner, Joao </a:t>
-            </a:r>
-            <a:r>
-              <a:rPr lang="en-US" altLang="zh-TW" sz="4800" b="1" dirty="0" err="1" smtClean="0">
+              <a:t>1</a:t>
+            </a:r>
+            <a:r>
+              <a:rPr lang="en-US" altLang="zh-TW" sz="3556" b="1" dirty="0" smtClean="0">
                 <a:solidFill>
                   <a:schemeClr val="bg1"/>
                 </a:solidFill>
@@ -4191,10 +4191,10 @@
                 <a:latin typeface="Tahoma"/>
                 <a:cs typeface="Tahoma"/>
               </a:rPr>
-              <a:t>Abecasis</a:t>
-            </a:r>
-            <a:r>
-              <a:rPr lang="en-US" altLang="zh-TW" sz="4800" b="1" dirty="0" smtClean="0">
+              <a:t>, </a:t>
+            </a:r>
+            <a:r>
+              <a:rPr lang="en-US" altLang="zh-TW" sz="3556" b="1" dirty="0" smtClean="0">
                 <a:solidFill>
                   <a:schemeClr val="bg1"/>
                 </a:solidFill>
@@ -4206,10 +4206,10 @@
                 <a:latin typeface="Tahoma"/>
                 <a:cs typeface="Tahoma"/>
               </a:rPr>
-              <a:t>, </a:t>
-            </a:r>
-            <a:r>
-              <a:rPr lang="en-US" altLang="zh-TW" sz="4800" b="1" dirty="0" err="1" smtClean="0">
+              <a:t>André </a:t>
+            </a:r>
+            <a:r>
+              <a:rPr lang="en-US" altLang="zh-TW" sz="3556" b="1" dirty="0" smtClean="0">
                 <a:solidFill>
                   <a:schemeClr val="bg1"/>
                 </a:solidFill>
@@ -4221,10 +4221,10 @@
                 <a:latin typeface="Tahoma"/>
                 <a:cs typeface="Tahoma"/>
               </a:rPr>
-              <a:t>Joohyun</a:t>
-            </a:r>
-            <a:r>
-              <a:rPr lang="en-US" altLang="zh-TW" sz="4800" b="1" dirty="0" smtClean="0">
+              <a:t>Merzky</a:t>
+            </a:r>
+            <a:r>
+              <a:rPr lang="en-US" altLang="zh-TW" sz="3556" b="1" baseline="30000" dirty="0" smtClean="0">
                 <a:solidFill>
                   <a:schemeClr val="bg1"/>
                 </a:solidFill>
@@ -4236,10 +4236,10 @@
                 <a:latin typeface="Tahoma"/>
                 <a:cs typeface="Tahoma"/>
               </a:rPr>
-              <a:t> Kim and  Andre </a:t>
-            </a:r>
-            <a:r>
-              <a:rPr lang="en-US" altLang="zh-TW" sz="4800" b="1" dirty="0" err="1" smtClean="0">
+              <a:t>1</a:t>
+            </a:r>
+            <a:r>
+              <a:rPr lang="en-US" altLang="zh-TW" sz="3556" b="1" dirty="0" smtClean="0">
                 <a:solidFill>
                   <a:schemeClr val="bg1"/>
                 </a:solidFill>
@@ -4251,39 +4251,10 @@
                 <a:latin typeface="Tahoma"/>
                 <a:cs typeface="Tahoma"/>
               </a:rPr>
-              <a:t>Luckow</a:t>
-            </a:r>
-            <a:r>
-              <a:rPr lang="en-US" altLang="zh-TW" sz="1400" dirty="0" smtClean="0">
-                <a:solidFill>
-                  <a:schemeClr val="bg1"/>
-                </a:solidFill>
-                <a:latin typeface="Tahoma"/>
-                <a:cs typeface="Tahoma"/>
-              </a:rPr>
-              <a:t/>
-            </a:r>
-            <a:br>
-              <a:rPr lang="en-US" altLang="zh-TW" sz="1400" dirty="0" smtClean="0">
-                <a:solidFill>
-                  <a:schemeClr val="bg1"/>
-                </a:solidFill>
-                <a:latin typeface="Tahoma"/>
-                <a:cs typeface="Tahoma"/>
-              </a:rPr>
-            </a:br>
-            <a:r>
-              <a:rPr lang="en-US" altLang="zh-TW" sz="1400" dirty="0" smtClean="0">
-                <a:solidFill>
-                  <a:schemeClr val="bg1"/>
-                </a:solidFill>
-                <a:latin typeface="Tahoma"/>
-                <a:cs typeface="Tahoma"/>
-              </a:rPr>
-              <a:t>1 </a:t>
-            </a:r>
-            <a:r>
-              <a:rPr lang="en-US" altLang="zh-TW" sz="3600" b="1" dirty="0" smtClean="0">
+              <a:t>, </a:t>
+            </a:r>
+            <a:r>
+              <a:rPr lang="en-US" altLang="zh-TW" sz="3556" b="1" dirty="0" smtClean="0">
                 <a:solidFill>
                   <a:schemeClr val="bg1"/>
                 </a:solidFill>
@@ -4295,10 +4266,10 @@
                 <a:latin typeface="Tahoma"/>
                 <a:cs typeface="Tahoma"/>
               </a:rPr>
-              <a:t>Center for Computation &amp; Technology, Louisiana State University, Baton Rouge, U.S.A.</a:t>
-            </a:r>
-            <a:br>
-              <a:rPr lang="en-US" altLang="zh-TW" sz="3600" b="1" dirty="0" smtClean="0">
+              <a:t>Ole </a:t>
+            </a:r>
+            <a:r>
+              <a:rPr lang="en-US" altLang="zh-TW" sz="3556" b="1" dirty="0" smtClean="0">
                 <a:solidFill>
                   <a:schemeClr val="bg1"/>
                 </a:solidFill>
@@ -4310,9 +4281,10 @@
                 <a:latin typeface="Tahoma"/>
                 <a:cs typeface="Tahoma"/>
               </a:rPr>
-            </a:br>
-            <a:r>
-              <a:rPr lang="en-US" altLang="zh-TW" sz="3600" b="1" baseline="30000" dirty="0" smtClean="0">
+              <a:t>Weidner</a:t>
+            </a:r>
+            <a:r>
+              <a:rPr lang="en-US" altLang="zh-TW" sz="3556" b="1" baseline="30000" dirty="0" smtClean="0">
                 <a:solidFill>
                   <a:schemeClr val="bg1"/>
                 </a:solidFill>
@@ -4324,10 +4296,10 @@
                 <a:latin typeface="Tahoma"/>
                 <a:cs typeface="Tahoma"/>
               </a:rPr>
-              <a:t>2</a:t>
-            </a:r>
-            <a:r>
-              <a:rPr lang="en-US" altLang="zh-TW" sz="3600" b="1" dirty="0" smtClean="0">
+              <a:t>1</a:t>
+            </a:r>
+            <a:r>
+              <a:rPr lang="en-US" altLang="zh-TW" sz="3556" b="1" dirty="0" smtClean="0">
                 <a:solidFill>
                   <a:schemeClr val="bg1"/>
                 </a:solidFill>
@@ -4339,9 +4311,322 @@
                 <a:latin typeface="Tahoma"/>
                 <a:cs typeface="Tahoma"/>
               </a:rPr>
-              <a:t>e-Science Institute, Edinburgh</a:t>
-            </a:r>
-            <a:endParaRPr lang="en-US" altLang="zh-TW" sz="5500" dirty="0" smtClean="0">
+              <a:t>, </a:t>
+            </a:r>
+            <a:r>
+              <a:rPr lang="en-US" altLang="zh-TW" sz="3556" b="1" dirty="0" smtClean="0">
+                <a:solidFill>
+                  <a:schemeClr val="bg1"/>
+                </a:solidFill>
+                <a:effectLst>
+                  <a:outerShdw blurRad="38100" dist="38100" dir="2700000" algn="tl">
+                    <a:srgbClr val="000000"/>
+                  </a:outerShdw>
+                </a:effectLst>
+                <a:latin typeface="Tahoma"/>
+                <a:cs typeface="Tahoma"/>
+              </a:rPr>
+              <a:t>Joao </a:t>
+            </a:r>
+            <a:r>
+              <a:rPr lang="en-US" altLang="zh-TW" sz="3556" b="1" dirty="0" smtClean="0">
+                <a:solidFill>
+                  <a:schemeClr val="bg1"/>
+                </a:solidFill>
+                <a:effectLst>
+                  <a:outerShdw blurRad="38100" dist="38100" dir="2700000" algn="tl">
+                    <a:srgbClr val="000000"/>
+                  </a:outerShdw>
+                </a:effectLst>
+                <a:latin typeface="Tahoma"/>
+                <a:cs typeface="Tahoma"/>
+              </a:rPr>
+              <a:t>Abecasis</a:t>
+            </a:r>
+            <a:r>
+              <a:rPr lang="en-US" altLang="zh-TW" sz="3556" b="1" baseline="30000" dirty="0" smtClean="0">
+                <a:solidFill>
+                  <a:schemeClr val="bg1"/>
+                </a:solidFill>
+                <a:effectLst>
+                  <a:outerShdw blurRad="38100" dist="38100" dir="2700000" algn="tl">
+                    <a:srgbClr val="000000"/>
+                  </a:outerShdw>
+                </a:effectLst>
+                <a:latin typeface="Tahoma"/>
+                <a:cs typeface="Tahoma"/>
+              </a:rPr>
+              <a:t>1</a:t>
+            </a:r>
+            <a:r>
+              <a:rPr lang="en-US" altLang="zh-TW" sz="3556" b="1" dirty="0" smtClean="0">
+                <a:solidFill>
+                  <a:schemeClr val="bg1"/>
+                </a:solidFill>
+                <a:effectLst>
+                  <a:outerShdw blurRad="38100" dist="38100" dir="2700000" algn="tl">
+                    <a:srgbClr val="000000"/>
+                  </a:outerShdw>
+                </a:effectLst>
+                <a:latin typeface="Tahoma"/>
+                <a:cs typeface="Tahoma"/>
+              </a:rPr>
+              <a:t>, </a:t>
+            </a:r>
+            <a:r>
+              <a:rPr lang="en-US" altLang="zh-TW" sz="3556" b="1" dirty="0" err="1" smtClean="0">
+                <a:solidFill>
+                  <a:schemeClr val="bg1"/>
+                </a:solidFill>
+                <a:effectLst>
+                  <a:outerShdw blurRad="38100" dist="38100" dir="2700000" algn="tl">
+                    <a:srgbClr val="000000"/>
+                  </a:outerShdw>
+                </a:effectLst>
+                <a:latin typeface="Tahoma"/>
+                <a:cs typeface="Tahoma"/>
+              </a:rPr>
+              <a:t>Joohyun</a:t>
+            </a:r>
+            <a:r>
+              <a:rPr lang="en-US" altLang="zh-TW" sz="3556" b="1" dirty="0" smtClean="0">
+                <a:solidFill>
+                  <a:schemeClr val="bg1"/>
+                </a:solidFill>
+                <a:effectLst>
+                  <a:outerShdw blurRad="38100" dist="38100" dir="2700000" algn="tl">
+                    <a:srgbClr val="000000"/>
+                  </a:outerShdw>
+                </a:effectLst>
+                <a:latin typeface="Tahoma"/>
+                <a:cs typeface="Tahoma"/>
+              </a:rPr>
+              <a:t> </a:t>
+            </a:r>
+            <a:r>
+              <a:rPr lang="en-US" altLang="zh-TW" sz="3556" b="1" dirty="0" smtClean="0">
+                <a:solidFill>
+                  <a:schemeClr val="bg1"/>
+                </a:solidFill>
+                <a:effectLst>
+                  <a:outerShdw blurRad="38100" dist="38100" dir="2700000" algn="tl">
+                    <a:srgbClr val="000000"/>
+                  </a:outerShdw>
+                </a:effectLst>
+                <a:latin typeface="Tahoma"/>
+                <a:cs typeface="Tahoma"/>
+              </a:rPr>
+              <a:t>Kim</a:t>
+            </a:r>
+            <a:r>
+              <a:rPr lang="en-US" altLang="zh-TW" sz="3556" b="1" baseline="30000" dirty="0" smtClean="0">
+                <a:solidFill>
+                  <a:schemeClr val="bg1"/>
+                </a:solidFill>
+                <a:effectLst>
+                  <a:outerShdw blurRad="38100" dist="38100" dir="2700000" algn="tl">
+                    <a:srgbClr val="000000"/>
+                  </a:outerShdw>
+                </a:effectLst>
+                <a:latin typeface="Tahoma"/>
+                <a:cs typeface="Tahoma"/>
+              </a:rPr>
+              <a:t>1</a:t>
+            </a:r>
+            <a:r>
+              <a:rPr lang="en-US" altLang="zh-TW" sz="3556" b="1" dirty="0" smtClean="0">
+                <a:solidFill>
+                  <a:schemeClr val="bg1"/>
+                </a:solidFill>
+                <a:effectLst>
+                  <a:outerShdw blurRad="38100" dist="38100" dir="2700000" algn="tl">
+                    <a:srgbClr val="000000"/>
+                  </a:outerShdw>
+                </a:effectLst>
+                <a:latin typeface="Tahoma"/>
+                <a:cs typeface="Tahoma"/>
+              </a:rPr>
+              <a:t> </a:t>
+            </a:r>
+            <a:r>
+              <a:rPr lang="en-US" altLang="zh-TW" sz="3556" b="1" dirty="0" smtClean="0">
+                <a:solidFill>
+                  <a:schemeClr val="bg1"/>
+                </a:solidFill>
+                <a:effectLst>
+                  <a:outerShdw blurRad="38100" dist="38100" dir="2700000" algn="tl">
+                    <a:srgbClr val="000000"/>
+                  </a:outerShdw>
+                </a:effectLst>
+                <a:latin typeface="Tahoma"/>
+                <a:cs typeface="Tahoma"/>
+              </a:rPr>
+              <a:t>and  Andre </a:t>
+            </a:r>
+            <a:r>
+              <a:rPr lang="en-US" altLang="zh-TW" sz="3556" b="1" dirty="0" smtClean="0">
+                <a:solidFill>
+                  <a:schemeClr val="bg1"/>
+                </a:solidFill>
+                <a:effectLst>
+                  <a:outerShdw blurRad="38100" dist="38100" dir="2700000" algn="tl">
+                    <a:srgbClr val="000000"/>
+                  </a:outerShdw>
+                </a:effectLst>
+                <a:latin typeface="Tahoma"/>
+                <a:cs typeface="Tahoma"/>
+              </a:rPr>
+              <a:t>Luckow</a:t>
+            </a:r>
+            <a:r>
+              <a:rPr lang="en-US" altLang="zh-TW" sz="3556" b="1" baseline="30000" dirty="0" smtClean="0">
+                <a:solidFill>
+                  <a:schemeClr val="bg1"/>
+                </a:solidFill>
+                <a:effectLst>
+                  <a:outerShdw blurRad="38100" dist="38100" dir="2700000" algn="tl">
+                    <a:srgbClr val="000000"/>
+                  </a:outerShdw>
+                </a:effectLst>
+                <a:latin typeface="Tahoma"/>
+                <a:cs typeface="Tahoma"/>
+              </a:rPr>
+              <a:t>3</a:t>
+            </a:r>
+            <a:r>
+              <a:rPr lang="en-US" altLang="zh-TW" sz="3556" dirty="0" smtClean="0">
+                <a:solidFill>
+                  <a:schemeClr val="bg1"/>
+                </a:solidFill>
+                <a:latin typeface="Tahoma"/>
+                <a:cs typeface="Tahoma"/>
+              </a:rPr>
+              <a:t/>
+            </a:r>
+            <a:br>
+              <a:rPr lang="en-US" altLang="zh-TW" sz="3556" dirty="0" smtClean="0">
+                <a:solidFill>
+                  <a:schemeClr val="bg1"/>
+                </a:solidFill>
+                <a:latin typeface="Tahoma"/>
+                <a:cs typeface="Tahoma"/>
+              </a:rPr>
+            </a:br>
+            <a:r>
+              <a:rPr lang="en-US" altLang="zh-TW" sz="3556" dirty="0" smtClean="0">
+                <a:solidFill>
+                  <a:schemeClr val="bg1"/>
+                </a:solidFill>
+                <a:latin typeface="Tahoma"/>
+                <a:cs typeface="Tahoma"/>
+              </a:rPr>
+              <a:t>1 </a:t>
+            </a:r>
+            <a:r>
+              <a:rPr lang="en-US" altLang="zh-TW" sz="3556" b="1" dirty="0" smtClean="0">
+                <a:solidFill>
+                  <a:schemeClr val="bg1"/>
+                </a:solidFill>
+                <a:effectLst>
+                  <a:outerShdw blurRad="38100" dist="38100" dir="2700000" algn="tl">
+                    <a:srgbClr val="000000"/>
+                  </a:outerShdw>
+                </a:effectLst>
+                <a:latin typeface="Tahoma"/>
+                <a:cs typeface="Tahoma"/>
+              </a:rPr>
+              <a:t>Center for Computation &amp; Technology, Louisiana State University, Baton Rouge, U.S.A.</a:t>
+            </a:r>
+            <a:br>
+              <a:rPr lang="en-US" altLang="zh-TW" sz="3556" b="1" dirty="0" smtClean="0">
+                <a:solidFill>
+                  <a:schemeClr val="bg1"/>
+                </a:solidFill>
+                <a:effectLst>
+                  <a:outerShdw blurRad="38100" dist="38100" dir="2700000" algn="tl">
+                    <a:srgbClr val="000000"/>
+                  </a:outerShdw>
+                </a:effectLst>
+                <a:latin typeface="Tahoma"/>
+                <a:cs typeface="Tahoma"/>
+              </a:rPr>
+            </a:br>
+            <a:r>
+              <a:rPr lang="en-US" altLang="zh-TW" sz="3556" b="1" baseline="30000" dirty="0" smtClean="0">
+                <a:solidFill>
+                  <a:schemeClr val="bg1"/>
+                </a:solidFill>
+                <a:effectLst>
+                  <a:outerShdw blurRad="38100" dist="38100" dir="2700000" algn="tl">
+                    <a:srgbClr val="000000"/>
+                  </a:outerShdw>
+                </a:effectLst>
+                <a:latin typeface="Tahoma"/>
+                <a:cs typeface="Tahoma"/>
+              </a:rPr>
+              <a:t>2</a:t>
+            </a:r>
+            <a:r>
+              <a:rPr lang="en-US" altLang="zh-TW" sz="3556" b="1" dirty="0" smtClean="0">
+                <a:solidFill>
+                  <a:schemeClr val="bg1"/>
+                </a:solidFill>
+                <a:effectLst>
+                  <a:outerShdw blurRad="38100" dist="38100" dir="2700000" algn="tl">
+                    <a:srgbClr val="000000"/>
+                  </a:outerShdw>
+                </a:effectLst>
+                <a:latin typeface="Tahoma"/>
+                <a:cs typeface="Tahoma"/>
+              </a:rPr>
+              <a:t>e-Science Institute, </a:t>
+            </a:r>
+            <a:r>
+              <a:rPr lang="en-US" altLang="zh-TW" sz="3556" b="1" dirty="0" smtClean="0">
+                <a:solidFill>
+                  <a:schemeClr val="bg1"/>
+                </a:solidFill>
+                <a:effectLst>
+                  <a:outerShdw blurRad="38100" dist="38100" dir="2700000" algn="tl">
+                    <a:srgbClr val="000000"/>
+                  </a:outerShdw>
+                </a:effectLst>
+                <a:latin typeface="Tahoma"/>
+                <a:cs typeface="Tahoma"/>
+              </a:rPr>
+              <a:t>Edinburgh.      </a:t>
+            </a:r>
+            <a:r>
+              <a:rPr lang="en-US" altLang="zh-TW" sz="3556" b="1" baseline="30000" dirty="0" smtClean="0">
+                <a:solidFill>
+                  <a:schemeClr val="bg1"/>
+                </a:solidFill>
+                <a:effectLst>
+                  <a:outerShdw blurRad="38100" dist="38100" dir="2700000" algn="tl">
+                    <a:srgbClr val="000000"/>
+                  </a:outerShdw>
+                </a:effectLst>
+                <a:latin typeface="Tahoma"/>
+                <a:cs typeface="Tahoma"/>
+              </a:rPr>
+              <a:t>3</a:t>
+            </a:r>
+            <a:r>
+              <a:rPr lang="en-US" altLang="zh-TW" sz="3556" b="1" dirty="0" smtClean="0">
+                <a:solidFill>
+                  <a:schemeClr val="bg1"/>
+                </a:solidFill>
+                <a:effectLst>
+                  <a:outerShdw blurRad="38100" dist="38100" dir="2700000" algn="tl">
+                    <a:srgbClr val="000000"/>
+                  </a:outerShdw>
+                </a:effectLst>
+                <a:latin typeface="Tahoma"/>
+                <a:cs typeface="Tahoma"/>
+              </a:rPr>
+              <a:t>Institute of Computer Science, Potsdam, Germany </a:t>
+            </a:r>
+            <a:endParaRPr lang="en-US" altLang="zh-TW" sz="3556" dirty="0" smtClean="0">
               <a:latin typeface="Tahoma"/>
               <a:cs typeface="Tahoma"/>
             </a:endParaRPr>
@@ -4880,68 +5165,22 @@
                 <a:latin typeface="Georgia"/>
                 <a:cs typeface="Georgia"/>
               </a:rPr>
-              <a:t>, T, Jha, S, Kaiser, </a:t>
+              <a:t>, T, Jha, S, Kaiser, H, </a:t>
+            </a:r>
+            <a:r>
+              <a:rPr lang="en-US" sz="3200" dirty="0" err="1" smtClean="0">
+                <a:latin typeface="Georgia"/>
+                <a:cs typeface="Georgia"/>
+              </a:rPr>
+              <a:t>Kielmann</a:t>
             </a:r>
             <a:r>
               <a:rPr lang="en-US" sz="3200" dirty="0" smtClean="0">
                 <a:latin typeface="Georgia"/>
                 <a:cs typeface="Georgia"/>
               </a:rPr>
-              <a:t>H, </a:t>
-            </a:r>
-            <a:r>
-              <a:rPr lang="en-US" sz="3200" dirty="0" err="1" smtClean="0">
-                <a:latin typeface="Georgia"/>
-                <a:cs typeface="Georgia"/>
-              </a:rPr>
-              <a:t>Kielmann</a:t>
-            </a:r>
-            <a:r>
-              <a:rPr lang="en-US" sz="3200" dirty="0" smtClean="0">
-                <a:latin typeface="Georgia"/>
-                <a:cs typeface="Georgia"/>
-              </a:rPr>
-              <a:t>, T, et al (</a:t>
-            </a:r>
-            <a:r>
-              <a:rPr lang="en-US" sz="3200" dirty="0" smtClean="0">
-                <a:latin typeface="Georgia"/>
-                <a:cs typeface="Georgia"/>
-              </a:rPr>
-              <a:t>2007</a:t>
-            </a:r>
-            <a:r>
-              <a:rPr lang="en-US" sz="3200" dirty="0" smtClean="0">
-                <a:latin typeface="Georgia"/>
-                <a:cs typeface="Georgia"/>
-              </a:rPr>
-              <a:t>), </a:t>
-            </a:r>
-            <a:r>
-              <a:rPr lang="en-US" sz="3200" dirty="0" smtClean="0">
-                <a:latin typeface="Georgia"/>
-                <a:cs typeface="Georgia"/>
-              </a:rPr>
-              <a:t>GFD-R-P.90 A Simple API for Grid </a:t>
-            </a:r>
-            <a:r>
-              <a:rPr lang="en-US" sz="3200" dirty="0" smtClean="0">
-                <a:latin typeface="Georgia"/>
-                <a:cs typeface="Georgia"/>
-              </a:rPr>
-              <a:t>Applications (SAGA) Open </a:t>
-            </a:r>
-            <a:r>
-              <a:rPr lang="en-US" sz="3200" dirty="0" smtClean="0">
-                <a:latin typeface="Georgia"/>
-                <a:cs typeface="Georgia"/>
-              </a:rPr>
-              <a:t>Grid Forum</a:t>
-            </a:r>
-            <a:endParaRPr lang="en-US" sz="3200" dirty="0" smtClean="0">
-              <a:latin typeface="Georgia"/>
-              <a:cs typeface="Georgia"/>
-            </a:endParaRPr>
+              <a:t>, T, et al (2007), GFD-R-P.90 A Simple API for Grid Applications (SAGA) Open Grid Forum</a:t>
+            </a:r>
           </a:p>
           <a:p>
             <a:pPr marL="514350" indent="-514350" algn="just">
@@ -4959,21 +5198,7 @@
                 <a:latin typeface="Georgia"/>
                 <a:cs typeface="Georgia"/>
               </a:rPr>
-              <a:t>The SAGA  Project </a:t>
-            </a:r>
-            <a:r>
-              <a:rPr lang="en-US" sz="3200" dirty="0" smtClean="0">
-                <a:latin typeface="Georgia"/>
-                <a:cs typeface="Georgia"/>
-              </a:rPr>
-              <a:t>[Online</a:t>
-            </a:r>
-            <a:r>
-              <a:rPr lang="en-US" sz="3200" dirty="0" smtClean="0">
-                <a:latin typeface="Georgia"/>
-                <a:cs typeface="Georgia"/>
-              </a:rPr>
-              <a:t>]: </a:t>
+              <a:t>The SAGA  Project [Online]: </a:t>
             </a:r>
             <a:r>
               <a:rPr lang="en-US" sz="3200" dirty="0" smtClean="0">
@@ -4981,15 +5206,7 @@
                 <a:cs typeface="Georgia"/>
                 <a:hlinkClick r:id="rId4"/>
               </a:rPr>
-              <a:t>http://saga.cct.lsu.</a:t>
-            </a:r>
-            <a:r>
-              <a:rPr lang="en-US" sz="3200" dirty="0" smtClean="0">
-                <a:latin typeface="Georgia"/>
-                <a:cs typeface="Georgia"/>
-                <a:hlinkClick r:id="rId4"/>
-              </a:rPr>
-              <a:t>edu</a:t>
+              <a:t>http://saga.cct.lsu.edu</a:t>
             </a:r>
             <a:endParaRPr lang="en-US" sz="3200" dirty="0" smtClean="0">
               <a:latin typeface="Georgia"/>
@@ -5170,21 +5387,7 @@
                 <a:latin typeface="Georgia"/>
                 <a:cs typeface="Georgia"/>
               </a:rPr>
-              <a:t>  and in part by NSF, the </a:t>
-            </a:r>
-            <a:r>
-              <a:rPr lang="en-US" sz="3600" dirty="0" smtClean="0">
-                <a:latin typeface="Georgia"/>
-                <a:cs typeface="Georgia"/>
-              </a:rPr>
-              <a:t>La Board</a:t>
-            </a:r>
-            <a:r>
-              <a:rPr lang="en-US" sz="3600" dirty="0" smtClean="0">
-                <a:latin typeface="Georgia"/>
-                <a:cs typeface="Georgia"/>
-              </a:rPr>
-              <a:t>-of-Regents and CCT funds.</a:t>
+              <a:t>  and in part by NSF, the La Board-of-Regents and CCT funds.</a:t>
             </a:r>
           </a:p>
         </p:txBody>
@@ -5308,10 +5511,6 @@
               </a:rPr>
               <a:t>.</a:t>
             </a:r>
-            <a:endParaRPr lang="en-US" sz="2800" dirty="0" smtClean="0">
-              <a:latin typeface="Georgia"/>
-              <a:cs typeface="Georgia"/>
-            </a:endParaRPr>
           </a:p>
         </p:txBody>
       </p:sp>
@@ -5369,13 +5568,6 @@
               </a:rPr>
               <a:t>Simple, Powerful Abstraction Layer</a:t>
             </a:r>
-            <a:endParaRPr lang="en-US" sz="5400" b="1" dirty="0" smtClean="0">
-              <a:solidFill>
-                <a:srgbClr val="000099"/>
-              </a:solidFill>
-              <a:latin typeface="Tahoma"/>
-              <a:cs typeface="Tahoma"/>
-            </a:endParaRPr>
           </a:p>
           <a:p>
             <a:pPr algn="just">
@@ -5391,75 +5583,8 @@
                 <a:latin typeface="Georgia"/>
                 <a:cs typeface="Georgia"/>
               </a:rPr>
-              <a:t>SAGA provides a simple,  powerful, programmatic interface. </a:t>
-            </a:r>
-            <a:r>
-              <a:rPr lang="en-US" sz="2800" dirty="0" smtClean="0">
-                <a:latin typeface="Georgia"/>
-                <a:cs typeface="Georgia"/>
-              </a:rPr>
-              <a:t>Additionally, SAGA provides the  abstractions from which commonly occurring patterns and usage modes  can be supported. </a:t>
-            </a:r>
-            <a:r>
-              <a:rPr lang="en-US" sz="2800" dirty="0" smtClean="0">
-                <a:latin typeface="Georgia"/>
-                <a:cs typeface="Georgia"/>
-              </a:rPr>
-              <a:t> Thus SAGA is </a:t>
-            </a:r>
-            <a:r>
-              <a:rPr lang="en-US" sz="2800" dirty="0" smtClean="0">
-                <a:latin typeface="Georgia"/>
-                <a:cs typeface="Georgia"/>
-              </a:rPr>
-              <a:t>being used to </a:t>
-            </a:r>
-            <a:r>
-              <a:rPr lang="en-US" sz="2800" dirty="0" smtClean="0">
-                <a:latin typeface="Georgia"/>
-                <a:cs typeface="Georgia"/>
-              </a:rPr>
-              <a:t>facilitate </a:t>
-            </a:r>
-            <a:r>
-              <a:rPr lang="en-US" sz="2800" dirty="0" smtClean="0">
-                <a:latin typeface="Georgia"/>
-                <a:cs typeface="Georgia"/>
-              </a:rPr>
-              <a:t>the uptake of distributed infrastructure and development of </a:t>
-            </a:r>
-            <a:r>
-              <a:rPr lang="en-US" sz="2800" dirty="0" smtClean="0">
-                <a:latin typeface="Georgia"/>
-                <a:cs typeface="Georgia"/>
-              </a:rPr>
-              <a:t>distributed </a:t>
-            </a:r>
-            <a:r>
-              <a:rPr lang="en-US" sz="2800" dirty="0" smtClean="0">
-                <a:latin typeface="Georgia"/>
-                <a:cs typeface="Georgia"/>
-              </a:rPr>
-              <a:t>applications in several critical </a:t>
-            </a:r>
-            <a:r>
-              <a:rPr lang="en-US" sz="2800" dirty="0" smtClean="0">
-                <a:latin typeface="Georgia"/>
-                <a:cs typeface="Georgia"/>
-              </a:rPr>
-              <a:t>ways. See figures below. For </a:t>
-            </a:r>
-            <a:r>
-              <a:rPr lang="en-US" sz="2800" dirty="0" smtClean="0">
-                <a:latin typeface="Georgia"/>
-                <a:cs typeface="Georgia"/>
-              </a:rPr>
-              <a:t>example:</a:t>
-            </a:r>
-            <a:endParaRPr lang="en-US" sz="2800" dirty="0" smtClean="0">
-              <a:latin typeface="Georgia"/>
-              <a:cs typeface="Georgia"/>
-            </a:endParaRPr>
+              <a:t>SAGA provides a simple,  powerful, programmatic interface. Additionally, SAGA provides the  abstractions from which commonly occurring patterns and usage modes  can be supported.  Thus SAGA is being used to facilitate the uptake of distributed infrastructure and development of distributed applications in several critical ways. See figures below. For example:</a:t>
+            </a:r>
           </a:p>
           <a:p>
             <a:pPr algn="just">
@@ -5477,84 +5602,7 @@
                 <a:latin typeface="Georgia"/>
                 <a:cs typeface="Georgia"/>
               </a:rPr>
-              <a:t> </a:t>
-            </a:r>
-            <a:r>
-              <a:rPr lang="en-US" sz="2800" dirty="0" smtClean="0">
-                <a:latin typeface="Georgia"/>
-                <a:cs typeface="Georgia"/>
-              </a:rPr>
-              <a:t>SAGA provides a single-interface across different middleware distributions and </a:t>
-            </a:r>
-            <a:r>
-              <a:rPr lang="en-US" sz="2800" dirty="0" smtClean="0">
-                <a:latin typeface="Georgia"/>
-                <a:cs typeface="Georgia"/>
-              </a:rPr>
-              <a:t>environments. SAGA provides </a:t>
-            </a:r>
-            <a:r>
-              <a:rPr lang="en-US" sz="2800" dirty="0" smtClean="0">
-                <a:latin typeface="Georgia"/>
-                <a:cs typeface="Georgia"/>
-              </a:rPr>
-              <a:t>adaptors </a:t>
-            </a:r>
-            <a:r>
-              <a:rPr lang="en-US" sz="2800" dirty="0" smtClean="0">
-                <a:latin typeface="Georgia"/>
-                <a:cs typeface="Georgia"/>
-              </a:rPr>
-              <a:t>for the most commonly occurring distributed </a:t>
-            </a:r>
-            <a:r>
-              <a:rPr lang="en-US" sz="2800" dirty="0" smtClean="0">
-                <a:latin typeface="Georgia"/>
-                <a:cs typeface="Georgia"/>
-              </a:rPr>
-              <a:t>environments</a:t>
-            </a:r>
-            <a:r>
-              <a:rPr lang="en-US" sz="2800" dirty="0" smtClean="0">
-                <a:latin typeface="Georgia"/>
-                <a:cs typeface="Georgia"/>
-              </a:rPr>
-              <a:t>.</a:t>
-            </a:r>
-            <a:r>
-              <a:rPr lang="en-US" sz="2800" dirty="0" smtClean="0">
-                <a:latin typeface="Georgia"/>
-                <a:cs typeface="Georgia"/>
-              </a:rPr>
-              <a:t> This enables the </a:t>
-            </a:r>
-            <a:r>
-              <a:rPr lang="en-US" sz="2800" dirty="0" smtClean="0">
-                <a:latin typeface="Georgia"/>
-                <a:cs typeface="Georgia"/>
-              </a:rPr>
-              <a:t>use of distributed infrastructure </a:t>
-            </a:r>
-            <a:r>
-              <a:rPr lang="en-US" sz="2800" dirty="0" smtClean="0">
-                <a:latin typeface="Georgia"/>
-                <a:cs typeface="Georgia"/>
-              </a:rPr>
-              <a:t>by. Therefore </a:t>
-            </a:r>
-            <a:r>
-              <a:rPr lang="en-US" sz="2800" dirty="0" smtClean="0">
-                <a:latin typeface="Georgia"/>
-                <a:cs typeface="Georgia"/>
-              </a:rPr>
-              <a:t>once an application has been written using SAGA it can be deployed and run on any environment in which SAGA is supported</a:t>
-            </a:r>
-            <a:r>
-              <a:rPr lang="en-US" sz="2800" dirty="0" smtClean="0">
-                <a:latin typeface="Georgia"/>
-                <a:cs typeface="Georgia"/>
-              </a:rPr>
-              <a:t>.</a:t>
+              <a:t> SAGA provides a single-interface across different middleware distributions and environments. SAGA provides adaptors for the most commonly occurring distributed environments. This enables the use of distributed infrastructure by. Therefore once an application has been written using SAGA it can be deployed and run on any environment in which SAGA is supported.</a:t>
             </a:r>
           </a:p>
           <a:p>
@@ -5587,21 +5635,7 @@
                 <a:latin typeface="Georgia"/>
                 <a:cs typeface="Georgia"/>
               </a:rPr>
-              <a:t>.  For example, a common characteristic of applications is existence of multiple sub-jobs and the need to launch and coordinate  these sub-jobs. These sub-jobs might be either identical (replicas) or different, and could be either </a:t>
-            </a:r>
-            <a:r>
-              <a:rPr lang="en-US" sz="2800" dirty="0" smtClean="0">
-                <a:latin typeface="Georgia"/>
-                <a:cs typeface="Georgia"/>
-              </a:rPr>
-              <a:t>loosely-</a:t>
-            </a:r>
-            <a:r>
-              <a:rPr lang="en-US" sz="2800" dirty="0" smtClean="0">
-                <a:latin typeface="Georgia"/>
-                <a:cs typeface="Georgia"/>
-              </a:rPr>
-              <a:t>coupled or de-coupled. SAGA supports these different application classes and usage modes by providing support for  hierarchical job-submission patterns, migration, and bulk submission  amongst others functionality. Other usage modes supported include Master-Worker.</a:t>
+              <a:t>.  For example, a common characteristic of applications is existence of multiple sub-jobs and the need to launch and coordinate  these sub-jobs. These sub-jobs might be either identical (replicas) or different, and could be either loosely-coupled or de-coupled. SAGA supports these different application classes and usage modes by providing support for  hierarchical job-submission patterns, migration, and bulk submission  amongst others functionality. Other usage modes supported include Master-Worker.</a:t>
             </a:r>
           </a:p>
           <a:p>
@@ -5620,68 +5654,36 @@
                 <a:latin typeface="Georgia"/>
                 <a:cs typeface="Georgia"/>
               </a:rPr>
-              <a:t> </a:t>
+              <a:t> For data-intensive applications, we create a framework that supports the common </a:t>
+            </a:r>
+            <a:r>
+              <a:rPr lang="en-US" sz="2800" dirty="0" err="1" smtClean="0">
+                <a:latin typeface="Georgia"/>
+                <a:cs typeface="Georgia"/>
+              </a:rPr>
+              <a:t>MapReduce</a:t>
             </a:r>
             <a:r>
               <a:rPr lang="en-US" sz="2800" dirty="0" smtClean="0">
                 <a:latin typeface="Georgia"/>
                 <a:cs typeface="Georgia"/>
               </a:rPr>
-              <a:t>F</a:t>
+              <a:t> </a:t>
+            </a:r>
+            <a:r>
+              <a:rPr lang="en-US" sz="2800" i="1" dirty="0" smtClean="0">
+                <a:latin typeface="Georgia"/>
+                <a:cs typeface="Georgia"/>
+              </a:rPr>
+              <a:t>pattern. </a:t>
             </a:r>
             <a:r>
               <a:rPr lang="en-US" sz="2800" dirty="0" smtClean="0">
                 <a:latin typeface="Georgia"/>
                 <a:cs typeface="Georgia"/>
               </a:rPr>
-              <a:t>or </a:t>
-            </a:r>
-            <a:r>
-              <a:rPr lang="en-US" sz="2800" dirty="0" smtClean="0">
-                <a:latin typeface="Georgia"/>
-                <a:cs typeface="Georgia"/>
-              </a:rPr>
-              <a:t>data-intensive applications, we create a framework that supports the common </a:t>
-            </a:r>
-            <a:r>
-              <a:rPr lang="en-US" sz="2800" dirty="0" err="1" smtClean="0">
-                <a:latin typeface="Georgia"/>
-                <a:cs typeface="Georgia"/>
-              </a:rPr>
-              <a:t>MapReduce</a:t>
-            </a:r>
-            <a:r>
-              <a:rPr lang="en-US" sz="2800" dirty="0" smtClean="0">
-                <a:latin typeface="Georgia"/>
-                <a:cs typeface="Georgia"/>
-              </a:rPr>
-              <a:t> </a:t>
-            </a:r>
-            <a:r>
-              <a:rPr lang="en-US" sz="2800" i="1" dirty="0" smtClean="0">
-                <a:latin typeface="Georgia"/>
-                <a:cs typeface="Georgia"/>
-              </a:rPr>
-              <a:t>pattern. </a:t>
-            </a:r>
-            <a:r>
-              <a:rPr lang="en-US" sz="2800" dirty="0" smtClean="0">
-                <a:latin typeface="Georgia"/>
-                <a:cs typeface="Georgia"/>
-              </a:rPr>
-              <a:t>There are </a:t>
-            </a:r>
-            <a:r>
-              <a:rPr lang="en-US" sz="2800" dirty="0" smtClean="0">
-                <a:latin typeface="Georgia"/>
-                <a:cs typeface="Georgia"/>
-              </a:rPr>
-              <a:t>many other patterns that can be created in a infrastructure-independent manner, thus enabling traditional applications (such as sequence alignment and searching) to be reformulated to use these patterns and exploit distributed infrastructure. </a:t>
-            </a:r>
-            <a:endParaRPr lang="en-US" sz="2800" dirty="0" smtClean="0">
-              <a:latin typeface="Georgia"/>
-              <a:cs typeface="Georgia"/>
-            </a:endParaRPr>
+              <a:t>There are many other patterns that can be created in a infrastructure-independent manner, thus enabling traditional applications (such as sequence alignment and searching) to be reformulated to use these patterns and exploit distributed infrastructure. </a:t>
+            </a:r>
           </a:p>
           <a:p>
             <a:pPr algn="just">
@@ -5709,8 +5711,8 @@
           </p:cNvPicPr>
           <p:nvPr/>
         </p:nvPicPr>
-        <mc:AlternateContent>
-          <mc:Choice xmlns:ma="http://schemas.microsoft.com/office/mac/drawingml/2008/main" Requires="ma">
+        <mc:AlternateContent xmlns:ma="http://schemas.microsoft.com/office/mac/drawingml/2008/main">
+          <mc:Choice Requires="ma">
             <p:blipFill>
               <a:blip r:embed="rId6"/>
               <a:stretch>
@@ -5718,7 +5720,7 @@
               </a:stretch>
             </p:blipFill>
           </mc:Choice>
-          <mc:Fallback>
+          <mc:Fallback xmlns:p="http://schemas.openxmlformats.org/presentationml/2006/main" xmlns:mv="urn:schemas-microsoft-com:mac:vml" xmlns:mc="http://schemas.openxmlformats.org/markup-compatibility/2006" xmlns:r="http://schemas.openxmlformats.org/officeDocument/2006/relationships" xmlns:a="http://schemas.openxmlformats.org/drawingml/2006/main" xmlns="">
             <p:blipFill>
               <a:blip r:embed="rId7"/>
               <a:stretch>
@@ -5745,8 +5747,8 @@
           </p:cNvPicPr>
           <p:nvPr/>
         </p:nvPicPr>
-        <mc:AlternateContent>
-          <mc:Choice xmlns:ma="http://schemas.microsoft.com/office/mac/drawingml/2008/main" Requires="ma">
+        <mc:AlternateContent xmlns:ma="http://schemas.microsoft.com/office/mac/drawingml/2008/main">
+          <mc:Choice Requires="ma">
             <p:blipFill>
               <a:blip r:embed="rId8"/>
               <a:stretch>
@@ -5754,7 +5756,7 @@
               </a:stretch>
             </p:blipFill>
           </mc:Choice>
-          <mc:Fallback>
+          <mc:Fallback xmlns:p="http://schemas.openxmlformats.org/presentationml/2006/main" xmlns:mv="urn:schemas-microsoft-com:mac:vml" xmlns:mc="http://schemas.openxmlformats.org/markup-compatibility/2006" xmlns:r="http://schemas.openxmlformats.org/officeDocument/2006/relationships" xmlns:a="http://schemas.openxmlformats.org/drawingml/2006/main" xmlns="">
             <p:blipFill>
               <a:blip r:embed="rId9"/>
               <a:stretch>
@@ -5811,17 +5813,7 @@
                 <a:latin typeface="Tahoma"/>
                 <a:cs typeface="Tahoma"/>
               </a:rPr>
-              <a:t>Enabling</a:t>
-            </a:r>
-            <a:r>
-              <a:rPr lang="en-US" sz="5400" b="1" dirty="0" smtClean="0">
-                <a:solidFill>
-                  <a:srgbClr val="000099"/>
-                </a:solidFill>
-                <a:latin typeface="Tahoma"/>
-                <a:cs typeface="Tahoma"/>
-              </a:rPr>
-              <a:t> Distributed Applications</a:t>
+              <a:t>Enabling Distributed Applications</a:t>
             </a:r>
           </a:p>
           <a:p>
@@ -5838,7 +5830,35 @@
                 <a:latin typeface="Georgia"/>
                 <a:cs typeface="Georgia"/>
               </a:rPr>
-              <a:t>SAGA can support a wide range of  applications types. Here we discuss three specific applications, belonging to difference categories, that we have developed using SAGA: </a:t>
+              <a:t>SAGA can support a wide range of  applications types. Here we discuss three specific applications, belonging to difference categories, that</a:t>
+            </a:r>
+            <a:r>
+              <a:rPr lang="en-US" sz="3200" dirty="0" smtClean="0">
+                <a:latin typeface="Georgia"/>
+                <a:cs typeface="Georgia"/>
+              </a:rPr>
+              <a:t>  </a:t>
+            </a:r>
+            <a:r>
+              <a:rPr lang="en-US" sz="3200" dirty="0" smtClean="0">
+                <a:latin typeface="Georgia"/>
+                <a:cs typeface="Georgia"/>
+              </a:rPr>
+              <a:t>have</a:t>
+            </a:r>
+            <a:r>
+              <a:rPr lang="en-US" sz="3200" dirty="0" smtClean="0">
+                <a:latin typeface="Georgia"/>
+                <a:cs typeface="Georgia"/>
+              </a:rPr>
+              <a:t> been developed </a:t>
+            </a:r>
+            <a:r>
+              <a:rPr lang="en-US" sz="3200" dirty="0" smtClean="0">
+                <a:latin typeface="Georgia"/>
+                <a:cs typeface="Georgia"/>
+              </a:rPr>
+              <a:t>using SAGA: </a:t>
             </a:r>
           </a:p>
           <a:p>
@@ -5937,7 +5957,70 @@
                 <a:latin typeface="Georgia"/>
                 <a:cs typeface="Georgia"/>
               </a:rPr>
-              <a:t>deployed while the orchestration/management is done using agents written in SAGA. This approach has been used to implement distributed replica exchange (RE), and the time-to-solution  (</a:t>
+              <a:t>deployed while the </a:t>
+            </a:r>
+            <a:r>
+              <a:rPr lang="en-US" sz="3200" dirty="0" smtClean="0">
+                <a:latin typeface="Georgia"/>
+                <a:cs typeface="Georgia"/>
+              </a:rPr>
+              <a:t>orchestration </a:t>
+            </a:r>
+            <a:r>
+              <a:rPr lang="en-US" sz="3200" dirty="0" smtClean="0">
+                <a:latin typeface="Georgia"/>
+                <a:cs typeface="Georgia"/>
+              </a:rPr>
+              <a:t>&amp; </a:t>
+            </a:r>
+            <a:r>
+              <a:rPr lang="en-US" sz="3200" dirty="0" smtClean="0">
+                <a:latin typeface="Georgia"/>
+                <a:cs typeface="Georgia"/>
+              </a:rPr>
+              <a:t>management </a:t>
+            </a:r>
+            <a:r>
+              <a:rPr lang="en-US" sz="3200" dirty="0" smtClean="0">
+                <a:latin typeface="Georgia"/>
+                <a:cs typeface="Georgia"/>
+              </a:rPr>
+              <a:t>is done using agents written in SAGA. This approach has been used to implement distributed replica exchange (RE</a:t>
+            </a:r>
+            <a:r>
+              <a:rPr lang="en-US" sz="3200" dirty="0" smtClean="0">
+                <a:latin typeface="Georgia"/>
+                <a:cs typeface="Georgia"/>
+              </a:rPr>
+              <a:t>) (Fig below). The time</a:t>
+            </a:r>
+            <a:r>
+              <a:rPr lang="en-US" sz="3200" dirty="0" smtClean="0">
+                <a:latin typeface="Georgia"/>
+                <a:cs typeface="Georgia"/>
+              </a:rPr>
+              <a:t>-to-</a:t>
+            </a:r>
+            <a:r>
+              <a:rPr lang="en-US" sz="3200" dirty="0" smtClean="0">
+                <a:latin typeface="Georgia"/>
+                <a:cs typeface="Georgia"/>
+              </a:rPr>
+              <a:t>solution</a:t>
+            </a:r>
+            <a:r>
+              <a:rPr lang="en-US" sz="3200" dirty="0" smtClean="0">
+                <a:latin typeface="Georgia"/>
+                <a:cs typeface="Georgia"/>
+              </a:rPr>
+              <a:t> </a:t>
+            </a:r>
+            <a:r>
+              <a:rPr lang="en-US" sz="3200" dirty="0" smtClean="0">
+                <a:latin typeface="Georgia"/>
+                <a:cs typeface="Georgia"/>
+              </a:rPr>
+              <a:t>(</a:t>
             </a:r>
             <a:r>
               <a:rPr lang="en-US" sz="3200" dirty="0" err="1" smtClean="0">
@@ -5951,14 +6034,42 @@
                 <a:latin typeface="Georgia"/>
                 <a:cs typeface="Georgia"/>
               </a:rPr>
-              <a:t>. # of exchanges) decreases with increasing number of distributed resources </a:t>
-            </a:r>
-            <a:r>
-              <a:rPr lang="en-US" sz="3200" dirty="0" err="1" smtClean="0">
+              <a:t>. # of exchanges) decreases with</a:t>
+            </a:r>
+            <a:r>
+              <a:rPr lang="en-US" sz="3200" dirty="0" smtClean="0">
                 <a:latin typeface="Georgia"/>
                 <a:cs typeface="Georgia"/>
               </a:rPr>
-              <a:t>utilised</a:t>
+              <a:t> </a:t>
+            </a:r>
+            <a:r>
+              <a:rPr lang="en-US" sz="3200" dirty="0" smtClean="0">
+                <a:latin typeface="Georgia"/>
+                <a:cs typeface="Georgia"/>
+              </a:rPr>
+              <a:t>greater </a:t>
+            </a:r>
+            <a:r>
+              <a:rPr lang="en-US" sz="3200" dirty="0" smtClean="0">
+                <a:latin typeface="Georgia"/>
+                <a:cs typeface="Georgia"/>
+              </a:rPr>
+              <a:t>number </a:t>
+            </a:r>
+            <a:r>
+              <a:rPr lang="en-US" sz="3200" dirty="0" smtClean="0">
+                <a:latin typeface="Georgia"/>
+                <a:cs typeface="Georgia"/>
+              </a:rPr>
+              <a:t>of distributed </a:t>
+            </a:r>
+            <a:r>
+              <a:rPr lang="en-US" sz="3200" dirty="0" smtClean="0">
+                <a:latin typeface="Georgia"/>
+                <a:cs typeface="Georgia"/>
+              </a:rPr>
+              <a:t>resources</a:t>
             </a:r>
             <a:r>
               <a:rPr lang="en-US" sz="3200" dirty="0" smtClean="0">
@@ -6024,6 +6135,54 @@
           </a:p>
         </p:txBody>
       </p:sp>
+      <p:pic>
+        <p:nvPicPr>
+          <p:cNvPr id="31" name="Picture 30"/>
+          <p:cNvPicPr>
+            <a:picLocks noChangeAspect="1"/>
+          </p:cNvPicPr>
+          <p:nvPr/>
+        </p:nvPicPr>
+        <p:blipFill>
+          <a:blip r:embed="rId10"/>
+          <a:stretch>
+            <a:fillRect/>
+          </a:stretch>
+        </p:blipFill>
+        <p:spPr>
+          <a:xfrm>
+            <a:off x="2800534" y="30784800"/>
+            <a:ext cx="3981266" cy="1514995"/>
+          </a:xfrm>
+          <a:prstGeom prst="rect">
+            <a:avLst/>
+          </a:prstGeom>
+        </p:spPr>
+      </p:pic>
+      <p:pic>
+        <p:nvPicPr>
+          <p:cNvPr id="30" name="Picture 29" descr="nsf4c.tiff"/>
+          <p:cNvPicPr>
+            <a:picLocks noChangeAspect="1"/>
+          </p:cNvPicPr>
+          <p:nvPr/>
+        </p:nvPicPr>
+        <p:blipFill>
+          <a:blip r:embed="rId11"/>
+          <a:stretch>
+            <a:fillRect/>
+          </a:stretch>
+        </p:blipFill>
+        <p:spPr>
+          <a:xfrm>
+            <a:off x="533400" y="30480000"/>
+            <a:ext cx="1905000" cy="1905000"/>
+          </a:xfrm>
+          <a:prstGeom prst="rect">
+            <a:avLst/>
+          </a:prstGeom>
+        </p:spPr>
+      </p:pic>
     </p:spTree>
   </p:cSld>
   <p:clrMapOvr>

</xml_diff>